<commit_message>
added bottom bar to Week 4 slides
</commit_message>
<xml_diff>
--- a/Week-4/Week4slides.pptx
+++ b/Week-4/Week4slides.pptx
@@ -207,7 +207,7 @@
           <a:p>
             <a:fld id="{0CDF7614-3C46-F041-B6A3-57E4BCB15502}" type="datetimeFigureOut">
               <a:rPr lang="en-US" smtClean="0"/>
-              <a:t>2/14/18</a:t>
+              <a:t>2/23/18</a:t>
             </a:fld>
             <a:endParaRPr lang="en-US"/>
           </a:p>
@@ -656,7 +656,7 @@
           <a:p>
             <a:fld id="{61C69A6C-97A9-3D48-9B13-4D8BC4B2C88B}" type="datetimeFigureOut">
               <a:rPr lang="en-US" smtClean="0"/>
-              <a:t>2/14/18</a:t>
+              <a:t>2/23/18</a:t>
             </a:fld>
             <a:endParaRPr lang="en-US"/>
           </a:p>
@@ -826,7 +826,7 @@
           <a:p>
             <a:fld id="{61C69A6C-97A9-3D48-9B13-4D8BC4B2C88B}" type="datetimeFigureOut">
               <a:rPr lang="en-US" smtClean="0"/>
-              <a:t>2/14/18</a:t>
+              <a:t>2/23/18</a:t>
             </a:fld>
             <a:endParaRPr lang="en-US"/>
           </a:p>
@@ -1006,7 +1006,7 @@
           <a:p>
             <a:fld id="{61C69A6C-97A9-3D48-9B13-4D8BC4B2C88B}" type="datetimeFigureOut">
               <a:rPr lang="en-US" smtClean="0"/>
-              <a:t>2/14/18</a:t>
+              <a:t>2/23/18</a:t>
             </a:fld>
             <a:endParaRPr lang="en-US"/>
           </a:p>
@@ -1176,7 +1176,7 @@
           <a:p>
             <a:fld id="{61C69A6C-97A9-3D48-9B13-4D8BC4B2C88B}" type="datetimeFigureOut">
               <a:rPr lang="en-US" smtClean="0"/>
-              <a:t>2/14/18</a:t>
+              <a:t>2/23/18</a:t>
             </a:fld>
             <a:endParaRPr lang="en-US"/>
           </a:p>
@@ -1422,7 +1422,7 @@
           <a:p>
             <a:fld id="{61C69A6C-97A9-3D48-9B13-4D8BC4B2C88B}" type="datetimeFigureOut">
               <a:rPr lang="en-US" smtClean="0"/>
-              <a:t>2/14/18</a:t>
+              <a:t>2/23/18</a:t>
             </a:fld>
             <a:endParaRPr lang="en-US"/>
           </a:p>
@@ -1710,7 +1710,7 @@
           <a:p>
             <a:fld id="{61C69A6C-97A9-3D48-9B13-4D8BC4B2C88B}" type="datetimeFigureOut">
               <a:rPr lang="en-US" smtClean="0"/>
-              <a:t>2/14/18</a:t>
+              <a:t>2/23/18</a:t>
             </a:fld>
             <a:endParaRPr lang="en-US"/>
           </a:p>
@@ -2132,7 +2132,7 @@
           <a:p>
             <a:fld id="{61C69A6C-97A9-3D48-9B13-4D8BC4B2C88B}" type="datetimeFigureOut">
               <a:rPr lang="en-US" smtClean="0"/>
-              <a:t>2/14/18</a:t>
+              <a:t>2/23/18</a:t>
             </a:fld>
             <a:endParaRPr lang="en-US"/>
           </a:p>
@@ -2250,7 +2250,7 @@
           <a:p>
             <a:fld id="{61C69A6C-97A9-3D48-9B13-4D8BC4B2C88B}" type="datetimeFigureOut">
               <a:rPr lang="en-US" smtClean="0"/>
-              <a:t>2/14/18</a:t>
+              <a:t>2/23/18</a:t>
             </a:fld>
             <a:endParaRPr lang="en-US"/>
           </a:p>
@@ -2345,7 +2345,7 @@
           <a:p>
             <a:fld id="{61C69A6C-97A9-3D48-9B13-4D8BC4B2C88B}" type="datetimeFigureOut">
               <a:rPr lang="en-US" smtClean="0"/>
-              <a:t>2/14/18</a:t>
+              <a:t>2/23/18</a:t>
             </a:fld>
             <a:endParaRPr lang="en-US"/>
           </a:p>
@@ -2622,7 +2622,7 @@
           <a:p>
             <a:fld id="{61C69A6C-97A9-3D48-9B13-4D8BC4B2C88B}" type="datetimeFigureOut">
               <a:rPr lang="en-US" smtClean="0"/>
-              <a:t>2/14/18</a:t>
+              <a:t>2/23/18</a:t>
             </a:fld>
             <a:endParaRPr lang="en-US"/>
           </a:p>
@@ -2875,7 +2875,7 @@
           <a:p>
             <a:fld id="{61C69A6C-97A9-3D48-9B13-4D8BC4B2C88B}" type="datetimeFigureOut">
               <a:rPr lang="en-US" smtClean="0"/>
-              <a:t>2/14/18</a:t>
+              <a:t>2/23/18</a:t>
             </a:fld>
             <a:endParaRPr lang="en-US"/>
           </a:p>
@@ -3088,7 +3088,7 @@
           <a:p>
             <a:fld id="{61C69A6C-97A9-3D48-9B13-4D8BC4B2C88B}" type="datetimeFigureOut">
               <a:rPr lang="en-US" smtClean="0"/>
-              <a:t>2/14/18</a:t>
+              <a:t>2/23/18</a:t>
             </a:fld>
             <a:endParaRPr lang="en-US"/>
           </a:p>
@@ -3623,31 +3623,8 @@
                 <a:latin typeface="Rockwell"/>
                 <a:cs typeface="Rockwell"/>
               </a:rPr>
-              <a:t>Week </a:t>
-            </a:r>
-            <a:r>
-              <a:rPr lang="en-US" sz="2400" b="1" dirty="0" smtClean="0">
-                <a:solidFill>
-                  <a:schemeClr val="tx1">
-                    <a:lumMod val="50000"/>
-                    <a:lumOff val="50000"/>
-                  </a:schemeClr>
-                </a:solidFill>
-                <a:latin typeface="Rockwell"/>
-                <a:cs typeface="Rockwell"/>
-              </a:rPr>
-              <a:t>4</a:t>
-            </a:r>
-            <a:endParaRPr lang="en-US" sz="2400" b="1" dirty="0" smtClean="0">
-              <a:solidFill>
-                <a:schemeClr val="tx1">
-                  <a:lumMod val="50000"/>
-                  <a:lumOff val="50000"/>
-                </a:schemeClr>
-              </a:solidFill>
-              <a:latin typeface="Rockwell"/>
-              <a:cs typeface="Rockwell"/>
-            </a:endParaRPr>
+              <a:t>Week 4</a:t>
+            </a:r>
           </a:p>
         </p:txBody>
       </p:sp>
@@ -4523,6 +4500,233 @@
           </a:prstGeom>
         </p:spPr>
       </p:pic>
+      <p:sp>
+        <p:nvSpPr>
+          <p:cNvPr id="11" name="Rectangle 10"/>
+          <p:cNvSpPr/>
+          <p:nvPr/>
+        </p:nvSpPr>
+        <p:spPr>
+          <a:xfrm>
+            <a:off x="3139571" y="6332355"/>
+            <a:ext cx="1428245" cy="539114"/>
+          </a:xfrm>
+          <a:prstGeom prst="rect">
+            <a:avLst/>
+          </a:prstGeom>
+          <a:solidFill>
+            <a:schemeClr val="accent3">
+              <a:lumMod val="50000"/>
+            </a:schemeClr>
+          </a:solidFill>
+          <a:ln>
+            <a:solidFill>
+              <a:srgbClr val="000000"/>
+            </a:solidFill>
+          </a:ln>
+          <a:effectLst/>
+        </p:spPr>
+        <p:style>
+          <a:lnRef idx="1">
+            <a:schemeClr val="accent1"/>
+          </a:lnRef>
+          <a:fillRef idx="3">
+            <a:schemeClr val="accent1"/>
+          </a:fillRef>
+          <a:effectRef idx="2">
+            <a:schemeClr val="accent1"/>
+          </a:effectRef>
+          <a:fontRef idx="minor">
+            <a:schemeClr val="lt1"/>
+          </a:fontRef>
+        </p:style>
+        <p:txBody>
+          <a:bodyPr rtlCol="0" anchor="ctr"/>
+          <a:lstStyle/>
+          <a:p>
+            <a:pPr algn="ctr"/>
+            <a:r>
+              <a:rPr lang="en-US" sz="1400" dirty="0" smtClean="0">
+                <a:solidFill>
+                  <a:srgbClr val="FFFFFF"/>
+                </a:solidFill>
+                <a:latin typeface="Rockwell"/>
+                <a:cs typeface="Rockwell"/>
+              </a:rPr>
+              <a:t>Multiple Linear Regression</a:t>
+            </a:r>
+            <a:endParaRPr lang="en-US" sz="1400" dirty="0">
+              <a:solidFill>
+                <a:srgbClr val="FFFFFF"/>
+              </a:solidFill>
+              <a:latin typeface="Rockwell"/>
+              <a:cs typeface="Rockwell"/>
+            </a:endParaRPr>
+          </a:p>
+        </p:txBody>
+      </p:sp>
+      <p:sp>
+        <p:nvSpPr>
+          <p:cNvPr id="15" name="Rectangle 14"/>
+          <p:cNvSpPr/>
+          <p:nvPr/>
+        </p:nvSpPr>
+        <p:spPr>
+          <a:xfrm>
+            <a:off x="4567817" y="6332355"/>
+            <a:ext cx="1428245" cy="539114"/>
+          </a:xfrm>
+          <a:prstGeom prst="rect">
+            <a:avLst/>
+          </a:prstGeom>
+          <a:solidFill>
+            <a:schemeClr val="accent3">
+              <a:lumMod val="60000"/>
+              <a:lumOff val="40000"/>
+            </a:schemeClr>
+          </a:solidFill>
+          <a:ln>
+            <a:solidFill>
+              <a:schemeClr val="tx1"/>
+            </a:solidFill>
+          </a:ln>
+          <a:effectLst/>
+        </p:spPr>
+        <p:style>
+          <a:lnRef idx="1">
+            <a:schemeClr val="accent1"/>
+          </a:lnRef>
+          <a:fillRef idx="3">
+            <a:schemeClr val="accent1"/>
+          </a:fillRef>
+          <a:effectRef idx="2">
+            <a:schemeClr val="accent1"/>
+          </a:effectRef>
+          <a:fontRef idx="minor">
+            <a:schemeClr val="lt1"/>
+          </a:fontRef>
+        </p:style>
+        <p:txBody>
+          <a:bodyPr rtlCol="0" anchor="ctr"/>
+          <a:lstStyle/>
+          <a:p>
+            <a:pPr algn="ctr"/>
+            <a:r>
+              <a:rPr lang="en-US" sz="1400" dirty="0" smtClean="0">
+                <a:solidFill>
+                  <a:srgbClr val="FFFFFF"/>
+                </a:solidFill>
+                <a:latin typeface="Rockwell"/>
+                <a:cs typeface="Rockwell"/>
+              </a:rPr>
+              <a:t>ANOVA</a:t>
+            </a:r>
+            <a:endParaRPr lang="en-US" sz="1400" dirty="0">
+              <a:solidFill>
+                <a:srgbClr val="FFFFFF"/>
+              </a:solidFill>
+              <a:latin typeface="Rockwell"/>
+              <a:cs typeface="Rockwell"/>
+            </a:endParaRPr>
+          </a:p>
+        </p:txBody>
+      </p:sp>
+      <p:sp>
+        <p:nvSpPr>
+          <p:cNvPr id="16" name="TextBox 15"/>
+          <p:cNvSpPr txBox="1"/>
+          <p:nvPr/>
+        </p:nvSpPr>
+        <p:spPr>
+          <a:xfrm>
+            <a:off x="1" y="6435277"/>
+            <a:ext cx="1014934" cy="307777"/>
+          </a:xfrm>
+          <a:prstGeom prst="rect">
+            <a:avLst/>
+          </a:prstGeom>
+          <a:noFill/>
+        </p:spPr>
+        <p:txBody>
+          <a:bodyPr wrap="none" rtlCol="0" anchor="ctr">
+            <a:spAutoFit/>
+          </a:bodyPr>
+          <a:lstStyle/>
+          <a:p>
+            <a:r>
+              <a:rPr lang="en-US" sz="1400" dirty="0" smtClean="0">
+                <a:solidFill>
+                  <a:schemeClr val="bg1">
+                    <a:lumMod val="85000"/>
+                  </a:schemeClr>
+                </a:solidFill>
+                <a:latin typeface="Rockwell"/>
+                <a:cs typeface="Rockwell"/>
+              </a:rPr>
+              <a:t>MCB 293S</a:t>
+            </a:r>
+          </a:p>
+        </p:txBody>
+      </p:sp>
+      <p:sp>
+        <p:nvSpPr>
+          <p:cNvPr id="17" name="TextBox 16"/>
+          <p:cNvSpPr txBox="1"/>
+          <p:nvPr/>
+        </p:nvSpPr>
+        <p:spPr>
+          <a:xfrm>
+            <a:off x="8344983" y="6435277"/>
+            <a:ext cx="799017" cy="307777"/>
+          </a:xfrm>
+          <a:prstGeom prst="rect">
+            <a:avLst/>
+          </a:prstGeom>
+          <a:noFill/>
+        </p:spPr>
+        <p:txBody>
+          <a:bodyPr wrap="none" rtlCol="0" anchor="ctr">
+            <a:spAutoFit/>
+          </a:bodyPr>
+          <a:lstStyle/>
+          <a:p>
+            <a:pPr algn="r"/>
+            <a:r>
+              <a:rPr lang="en-US" sz="1400" dirty="0" smtClean="0">
+                <a:solidFill>
+                  <a:schemeClr val="bg1">
+                    <a:lumMod val="85000"/>
+                  </a:schemeClr>
+                </a:solidFill>
+                <a:latin typeface="Rockwell"/>
+                <a:cs typeface="Rockwell"/>
+              </a:rPr>
+              <a:t>Week </a:t>
+            </a:r>
+            <a:r>
+              <a:rPr lang="en-US" sz="1400" dirty="0" smtClean="0">
+                <a:solidFill>
+                  <a:schemeClr val="bg1">
+                    <a:lumMod val="85000"/>
+                  </a:schemeClr>
+                </a:solidFill>
+                <a:latin typeface="Rockwell"/>
+                <a:cs typeface="Rockwell"/>
+              </a:rPr>
+              <a:t>4</a:t>
+            </a:r>
+            <a:endParaRPr lang="en-US" sz="1400" dirty="0" smtClean="0">
+              <a:solidFill>
+                <a:schemeClr val="bg1">
+                  <a:lumMod val="85000"/>
+                </a:schemeClr>
+              </a:solidFill>
+              <a:latin typeface="Rockwell"/>
+              <a:cs typeface="Rockwell"/>
+            </a:endParaRPr>
+          </a:p>
+        </p:txBody>
+      </p:sp>
     </p:spTree>
     <p:extLst>
       <p:ext uri="{BB962C8B-B14F-4D97-AF65-F5344CB8AC3E}">
@@ -5154,6 +5358,233 @@
           </a:prstGeom>
         </p:spPr>
       </p:pic>
+      <p:sp>
+        <p:nvSpPr>
+          <p:cNvPr id="15" name="Rectangle 14"/>
+          <p:cNvSpPr/>
+          <p:nvPr/>
+        </p:nvSpPr>
+        <p:spPr>
+          <a:xfrm>
+            <a:off x="3139571" y="6332355"/>
+            <a:ext cx="1428245" cy="539114"/>
+          </a:xfrm>
+          <a:prstGeom prst="rect">
+            <a:avLst/>
+          </a:prstGeom>
+          <a:solidFill>
+            <a:schemeClr val="accent3">
+              <a:lumMod val="50000"/>
+            </a:schemeClr>
+          </a:solidFill>
+          <a:ln>
+            <a:solidFill>
+              <a:srgbClr val="000000"/>
+            </a:solidFill>
+          </a:ln>
+          <a:effectLst/>
+        </p:spPr>
+        <p:style>
+          <a:lnRef idx="1">
+            <a:schemeClr val="accent1"/>
+          </a:lnRef>
+          <a:fillRef idx="3">
+            <a:schemeClr val="accent1"/>
+          </a:fillRef>
+          <a:effectRef idx="2">
+            <a:schemeClr val="accent1"/>
+          </a:effectRef>
+          <a:fontRef idx="minor">
+            <a:schemeClr val="lt1"/>
+          </a:fontRef>
+        </p:style>
+        <p:txBody>
+          <a:bodyPr rtlCol="0" anchor="ctr"/>
+          <a:lstStyle/>
+          <a:p>
+            <a:pPr algn="ctr"/>
+            <a:r>
+              <a:rPr lang="en-US" sz="1400" dirty="0" smtClean="0">
+                <a:solidFill>
+                  <a:srgbClr val="FFFFFF"/>
+                </a:solidFill>
+                <a:latin typeface="Rockwell"/>
+                <a:cs typeface="Rockwell"/>
+              </a:rPr>
+              <a:t>Multiple Linear Regression</a:t>
+            </a:r>
+            <a:endParaRPr lang="en-US" sz="1400" dirty="0">
+              <a:solidFill>
+                <a:srgbClr val="FFFFFF"/>
+              </a:solidFill>
+              <a:latin typeface="Rockwell"/>
+              <a:cs typeface="Rockwell"/>
+            </a:endParaRPr>
+          </a:p>
+        </p:txBody>
+      </p:sp>
+      <p:sp>
+        <p:nvSpPr>
+          <p:cNvPr id="16" name="Rectangle 15"/>
+          <p:cNvSpPr/>
+          <p:nvPr/>
+        </p:nvSpPr>
+        <p:spPr>
+          <a:xfrm>
+            <a:off x="4567817" y="6332355"/>
+            <a:ext cx="1428245" cy="539114"/>
+          </a:xfrm>
+          <a:prstGeom prst="rect">
+            <a:avLst/>
+          </a:prstGeom>
+          <a:solidFill>
+            <a:schemeClr val="accent3">
+              <a:lumMod val="60000"/>
+              <a:lumOff val="40000"/>
+            </a:schemeClr>
+          </a:solidFill>
+          <a:ln>
+            <a:solidFill>
+              <a:schemeClr val="tx1"/>
+            </a:solidFill>
+          </a:ln>
+          <a:effectLst/>
+        </p:spPr>
+        <p:style>
+          <a:lnRef idx="1">
+            <a:schemeClr val="accent1"/>
+          </a:lnRef>
+          <a:fillRef idx="3">
+            <a:schemeClr val="accent1"/>
+          </a:fillRef>
+          <a:effectRef idx="2">
+            <a:schemeClr val="accent1"/>
+          </a:effectRef>
+          <a:fontRef idx="minor">
+            <a:schemeClr val="lt1"/>
+          </a:fontRef>
+        </p:style>
+        <p:txBody>
+          <a:bodyPr rtlCol="0" anchor="ctr"/>
+          <a:lstStyle/>
+          <a:p>
+            <a:pPr algn="ctr"/>
+            <a:r>
+              <a:rPr lang="en-US" sz="1400" dirty="0" smtClean="0">
+                <a:solidFill>
+                  <a:srgbClr val="FFFFFF"/>
+                </a:solidFill>
+                <a:latin typeface="Rockwell"/>
+                <a:cs typeface="Rockwell"/>
+              </a:rPr>
+              <a:t>ANOVA</a:t>
+            </a:r>
+            <a:endParaRPr lang="en-US" sz="1400" dirty="0">
+              <a:solidFill>
+                <a:srgbClr val="FFFFFF"/>
+              </a:solidFill>
+              <a:latin typeface="Rockwell"/>
+              <a:cs typeface="Rockwell"/>
+            </a:endParaRPr>
+          </a:p>
+        </p:txBody>
+      </p:sp>
+      <p:sp>
+        <p:nvSpPr>
+          <p:cNvPr id="17" name="TextBox 16"/>
+          <p:cNvSpPr txBox="1"/>
+          <p:nvPr/>
+        </p:nvSpPr>
+        <p:spPr>
+          <a:xfrm>
+            <a:off x="1" y="6435277"/>
+            <a:ext cx="1014934" cy="307777"/>
+          </a:xfrm>
+          <a:prstGeom prst="rect">
+            <a:avLst/>
+          </a:prstGeom>
+          <a:noFill/>
+        </p:spPr>
+        <p:txBody>
+          <a:bodyPr wrap="none" rtlCol="0" anchor="ctr">
+            <a:spAutoFit/>
+          </a:bodyPr>
+          <a:lstStyle/>
+          <a:p>
+            <a:r>
+              <a:rPr lang="en-US" sz="1400" dirty="0" smtClean="0">
+                <a:solidFill>
+                  <a:schemeClr val="bg1">
+                    <a:lumMod val="85000"/>
+                  </a:schemeClr>
+                </a:solidFill>
+                <a:latin typeface="Rockwell"/>
+                <a:cs typeface="Rockwell"/>
+              </a:rPr>
+              <a:t>MCB 293S</a:t>
+            </a:r>
+          </a:p>
+        </p:txBody>
+      </p:sp>
+      <p:sp>
+        <p:nvSpPr>
+          <p:cNvPr id="18" name="TextBox 17"/>
+          <p:cNvSpPr txBox="1"/>
+          <p:nvPr/>
+        </p:nvSpPr>
+        <p:spPr>
+          <a:xfrm>
+            <a:off x="8344983" y="6435277"/>
+            <a:ext cx="799017" cy="307777"/>
+          </a:xfrm>
+          <a:prstGeom prst="rect">
+            <a:avLst/>
+          </a:prstGeom>
+          <a:noFill/>
+        </p:spPr>
+        <p:txBody>
+          <a:bodyPr wrap="none" rtlCol="0" anchor="ctr">
+            <a:spAutoFit/>
+          </a:bodyPr>
+          <a:lstStyle/>
+          <a:p>
+            <a:pPr algn="r"/>
+            <a:r>
+              <a:rPr lang="en-US" sz="1400" dirty="0" smtClean="0">
+                <a:solidFill>
+                  <a:schemeClr val="bg1">
+                    <a:lumMod val="85000"/>
+                  </a:schemeClr>
+                </a:solidFill>
+                <a:latin typeface="Rockwell"/>
+                <a:cs typeface="Rockwell"/>
+              </a:rPr>
+              <a:t>Week </a:t>
+            </a:r>
+            <a:r>
+              <a:rPr lang="en-US" sz="1400" dirty="0" smtClean="0">
+                <a:solidFill>
+                  <a:schemeClr val="bg1">
+                    <a:lumMod val="85000"/>
+                  </a:schemeClr>
+                </a:solidFill>
+                <a:latin typeface="Rockwell"/>
+                <a:cs typeface="Rockwell"/>
+              </a:rPr>
+              <a:t>4</a:t>
+            </a:r>
+            <a:endParaRPr lang="en-US" sz="1400" dirty="0" smtClean="0">
+              <a:solidFill>
+                <a:schemeClr val="bg1">
+                  <a:lumMod val="85000"/>
+                </a:schemeClr>
+              </a:solidFill>
+              <a:latin typeface="Rockwell"/>
+              <a:cs typeface="Rockwell"/>
+            </a:endParaRPr>
+          </a:p>
+        </p:txBody>
+      </p:sp>
     </p:spTree>
     <p:extLst>
       <p:ext uri="{BB962C8B-B14F-4D97-AF65-F5344CB8AC3E}">
@@ -5744,6 +6175,233 @@
           </a:fontRef>
         </p:style>
       </p:cxnSp>
+      <p:sp>
+        <p:nvSpPr>
+          <p:cNvPr id="14" name="Rectangle 13"/>
+          <p:cNvSpPr/>
+          <p:nvPr/>
+        </p:nvSpPr>
+        <p:spPr>
+          <a:xfrm>
+            <a:off x="3139571" y="6332355"/>
+            <a:ext cx="1428245" cy="539114"/>
+          </a:xfrm>
+          <a:prstGeom prst="rect">
+            <a:avLst/>
+          </a:prstGeom>
+          <a:solidFill>
+            <a:schemeClr val="accent3">
+              <a:lumMod val="50000"/>
+            </a:schemeClr>
+          </a:solidFill>
+          <a:ln>
+            <a:solidFill>
+              <a:srgbClr val="000000"/>
+            </a:solidFill>
+          </a:ln>
+          <a:effectLst/>
+        </p:spPr>
+        <p:style>
+          <a:lnRef idx="1">
+            <a:schemeClr val="accent1"/>
+          </a:lnRef>
+          <a:fillRef idx="3">
+            <a:schemeClr val="accent1"/>
+          </a:fillRef>
+          <a:effectRef idx="2">
+            <a:schemeClr val="accent1"/>
+          </a:effectRef>
+          <a:fontRef idx="minor">
+            <a:schemeClr val="lt1"/>
+          </a:fontRef>
+        </p:style>
+        <p:txBody>
+          <a:bodyPr rtlCol="0" anchor="ctr"/>
+          <a:lstStyle/>
+          <a:p>
+            <a:pPr algn="ctr"/>
+            <a:r>
+              <a:rPr lang="en-US" sz="1400" dirty="0" smtClean="0">
+                <a:solidFill>
+                  <a:srgbClr val="FFFFFF"/>
+                </a:solidFill>
+                <a:latin typeface="Rockwell"/>
+                <a:cs typeface="Rockwell"/>
+              </a:rPr>
+              <a:t>Multiple Linear Regression</a:t>
+            </a:r>
+            <a:endParaRPr lang="en-US" sz="1400" dirty="0">
+              <a:solidFill>
+                <a:srgbClr val="FFFFFF"/>
+              </a:solidFill>
+              <a:latin typeface="Rockwell"/>
+              <a:cs typeface="Rockwell"/>
+            </a:endParaRPr>
+          </a:p>
+        </p:txBody>
+      </p:sp>
+      <p:sp>
+        <p:nvSpPr>
+          <p:cNvPr id="15" name="Rectangle 14"/>
+          <p:cNvSpPr/>
+          <p:nvPr/>
+        </p:nvSpPr>
+        <p:spPr>
+          <a:xfrm>
+            <a:off x="4567817" y="6332355"/>
+            <a:ext cx="1428245" cy="539114"/>
+          </a:xfrm>
+          <a:prstGeom prst="rect">
+            <a:avLst/>
+          </a:prstGeom>
+          <a:solidFill>
+            <a:schemeClr val="accent3">
+              <a:lumMod val="60000"/>
+              <a:lumOff val="40000"/>
+            </a:schemeClr>
+          </a:solidFill>
+          <a:ln>
+            <a:solidFill>
+              <a:schemeClr val="tx1"/>
+            </a:solidFill>
+          </a:ln>
+          <a:effectLst/>
+        </p:spPr>
+        <p:style>
+          <a:lnRef idx="1">
+            <a:schemeClr val="accent1"/>
+          </a:lnRef>
+          <a:fillRef idx="3">
+            <a:schemeClr val="accent1"/>
+          </a:fillRef>
+          <a:effectRef idx="2">
+            <a:schemeClr val="accent1"/>
+          </a:effectRef>
+          <a:fontRef idx="minor">
+            <a:schemeClr val="lt1"/>
+          </a:fontRef>
+        </p:style>
+        <p:txBody>
+          <a:bodyPr rtlCol="0" anchor="ctr"/>
+          <a:lstStyle/>
+          <a:p>
+            <a:pPr algn="ctr"/>
+            <a:r>
+              <a:rPr lang="en-US" sz="1400" dirty="0" smtClean="0">
+                <a:solidFill>
+                  <a:srgbClr val="FFFFFF"/>
+                </a:solidFill>
+                <a:latin typeface="Rockwell"/>
+                <a:cs typeface="Rockwell"/>
+              </a:rPr>
+              <a:t>ANOVA</a:t>
+            </a:r>
+            <a:endParaRPr lang="en-US" sz="1400" dirty="0">
+              <a:solidFill>
+                <a:srgbClr val="FFFFFF"/>
+              </a:solidFill>
+              <a:latin typeface="Rockwell"/>
+              <a:cs typeface="Rockwell"/>
+            </a:endParaRPr>
+          </a:p>
+        </p:txBody>
+      </p:sp>
+      <p:sp>
+        <p:nvSpPr>
+          <p:cNvPr id="16" name="TextBox 15"/>
+          <p:cNvSpPr txBox="1"/>
+          <p:nvPr/>
+        </p:nvSpPr>
+        <p:spPr>
+          <a:xfrm>
+            <a:off x="1" y="6435277"/>
+            <a:ext cx="1014934" cy="307777"/>
+          </a:xfrm>
+          <a:prstGeom prst="rect">
+            <a:avLst/>
+          </a:prstGeom>
+          <a:noFill/>
+        </p:spPr>
+        <p:txBody>
+          <a:bodyPr wrap="none" rtlCol="0" anchor="ctr">
+            <a:spAutoFit/>
+          </a:bodyPr>
+          <a:lstStyle/>
+          <a:p>
+            <a:r>
+              <a:rPr lang="en-US" sz="1400" dirty="0" smtClean="0">
+                <a:solidFill>
+                  <a:schemeClr val="bg1">
+                    <a:lumMod val="85000"/>
+                  </a:schemeClr>
+                </a:solidFill>
+                <a:latin typeface="Rockwell"/>
+                <a:cs typeface="Rockwell"/>
+              </a:rPr>
+              <a:t>MCB 293S</a:t>
+            </a:r>
+          </a:p>
+        </p:txBody>
+      </p:sp>
+      <p:sp>
+        <p:nvSpPr>
+          <p:cNvPr id="17" name="TextBox 16"/>
+          <p:cNvSpPr txBox="1"/>
+          <p:nvPr/>
+        </p:nvSpPr>
+        <p:spPr>
+          <a:xfrm>
+            <a:off x="8344983" y="6435277"/>
+            <a:ext cx="799017" cy="307777"/>
+          </a:xfrm>
+          <a:prstGeom prst="rect">
+            <a:avLst/>
+          </a:prstGeom>
+          <a:noFill/>
+        </p:spPr>
+        <p:txBody>
+          <a:bodyPr wrap="none" rtlCol="0" anchor="ctr">
+            <a:spAutoFit/>
+          </a:bodyPr>
+          <a:lstStyle/>
+          <a:p>
+            <a:pPr algn="r"/>
+            <a:r>
+              <a:rPr lang="en-US" sz="1400" dirty="0" smtClean="0">
+                <a:solidFill>
+                  <a:schemeClr val="bg1">
+                    <a:lumMod val="85000"/>
+                  </a:schemeClr>
+                </a:solidFill>
+                <a:latin typeface="Rockwell"/>
+                <a:cs typeface="Rockwell"/>
+              </a:rPr>
+              <a:t>Week </a:t>
+            </a:r>
+            <a:r>
+              <a:rPr lang="en-US" sz="1400" dirty="0" smtClean="0">
+                <a:solidFill>
+                  <a:schemeClr val="bg1">
+                    <a:lumMod val="85000"/>
+                  </a:schemeClr>
+                </a:solidFill>
+                <a:latin typeface="Rockwell"/>
+                <a:cs typeface="Rockwell"/>
+              </a:rPr>
+              <a:t>4</a:t>
+            </a:r>
+            <a:endParaRPr lang="en-US" sz="1400" dirty="0" smtClean="0">
+              <a:solidFill>
+                <a:schemeClr val="bg1">
+                  <a:lumMod val="85000"/>
+                </a:schemeClr>
+              </a:solidFill>
+              <a:latin typeface="Rockwell"/>
+              <a:cs typeface="Rockwell"/>
+            </a:endParaRPr>
+          </a:p>
+        </p:txBody>
+      </p:sp>
     </p:spTree>
     <p:extLst>
       <p:ext uri="{BB962C8B-B14F-4D97-AF65-F5344CB8AC3E}">
@@ -6915,6 +7573,233 @@
             <a:endParaRPr lang="en-US" dirty="0">
               <a:latin typeface="Consolas"/>
               <a:cs typeface="Consolas"/>
+            </a:endParaRPr>
+          </a:p>
+        </p:txBody>
+      </p:sp>
+      <p:sp>
+        <p:nvSpPr>
+          <p:cNvPr id="20" name="Rectangle 19"/>
+          <p:cNvSpPr/>
+          <p:nvPr/>
+        </p:nvSpPr>
+        <p:spPr>
+          <a:xfrm>
+            <a:off x="3139571" y="6332355"/>
+            <a:ext cx="1428245" cy="539114"/>
+          </a:xfrm>
+          <a:prstGeom prst="rect">
+            <a:avLst/>
+          </a:prstGeom>
+          <a:solidFill>
+            <a:schemeClr val="accent3">
+              <a:lumMod val="50000"/>
+            </a:schemeClr>
+          </a:solidFill>
+          <a:ln>
+            <a:solidFill>
+              <a:srgbClr val="000000"/>
+            </a:solidFill>
+          </a:ln>
+          <a:effectLst/>
+        </p:spPr>
+        <p:style>
+          <a:lnRef idx="1">
+            <a:schemeClr val="accent1"/>
+          </a:lnRef>
+          <a:fillRef idx="3">
+            <a:schemeClr val="accent1"/>
+          </a:fillRef>
+          <a:effectRef idx="2">
+            <a:schemeClr val="accent1"/>
+          </a:effectRef>
+          <a:fontRef idx="minor">
+            <a:schemeClr val="lt1"/>
+          </a:fontRef>
+        </p:style>
+        <p:txBody>
+          <a:bodyPr rtlCol="0" anchor="ctr"/>
+          <a:lstStyle/>
+          <a:p>
+            <a:pPr algn="ctr"/>
+            <a:r>
+              <a:rPr lang="en-US" sz="1400" dirty="0" smtClean="0">
+                <a:solidFill>
+                  <a:srgbClr val="FFFFFF"/>
+                </a:solidFill>
+                <a:latin typeface="Rockwell"/>
+                <a:cs typeface="Rockwell"/>
+              </a:rPr>
+              <a:t>Multiple Linear Regression</a:t>
+            </a:r>
+            <a:endParaRPr lang="en-US" sz="1400" dirty="0">
+              <a:solidFill>
+                <a:srgbClr val="FFFFFF"/>
+              </a:solidFill>
+              <a:latin typeface="Rockwell"/>
+              <a:cs typeface="Rockwell"/>
+            </a:endParaRPr>
+          </a:p>
+        </p:txBody>
+      </p:sp>
+      <p:sp>
+        <p:nvSpPr>
+          <p:cNvPr id="21" name="Rectangle 20"/>
+          <p:cNvSpPr/>
+          <p:nvPr/>
+        </p:nvSpPr>
+        <p:spPr>
+          <a:xfrm>
+            <a:off x="4567817" y="6332355"/>
+            <a:ext cx="1428245" cy="539114"/>
+          </a:xfrm>
+          <a:prstGeom prst="rect">
+            <a:avLst/>
+          </a:prstGeom>
+          <a:solidFill>
+            <a:schemeClr val="accent3">
+              <a:lumMod val="60000"/>
+              <a:lumOff val="40000"/>
+            </a:schemeClr>
+          </a:solidFill>
+          <a:ln>
+            <a:solidFill>
+              <a:schemeClr val="tx1"/>
+            </a:solidFill>
+          </a:ln>
+          <a:effectLst/>
+        </p:spPr>
+        <p:style>
+          <a:lnRef idx="1">
+            <a:schemeClr val="accent1"/>
+          </a:lnRef>
+          <a:fillRef idx="3">
+            <a:schemeClr val="accent1"/>
+          </a:fillRef>
+          <a:effectRef idx="2">
+            <a:schemeClr val="accent1"/>
+          </a:effectRef>
+          <a:fontRef idx="minor">
+            <a:schemeClr val="lt1"/>
+          </a:fontRef>
+        </p:style>
+        <p:txBody>
+          <a:bodyPr rtlCol="0" anchor="ctr"/>
+          <a:lstStyle/>
+          <a:p>
+            <a:pPr algn="ctr"/>
+            <a:r>
+              <a:rPr lang="en-US" sz="1400" dirty="0" smtClean="0">
+                <a:solidFill>
+                  <a:srgbClr val="FFFFFF"/>
+                </a:solidFill>
+                <a:latin typeface="Rockwell"/>
+                <a:cs typeface="Rockwell"/>
+              </a:rPr>
+              <a:t>ANOVA</a:t>
+            </a:r>
+            <a:endParaRPr lang="en-US" sz="1400" dirty="0">
+              <a:solidFill>
+                <a:srgbClr val="FFFFFF"/>
+              </a:solidFill>
+              <a:latin typeface="Rockwell"/>
+              <a:cs typeface="Rockwell"/>
+            </a:endParaRPr>
+          </a:p>
+        </p:txBody>
+      </p:sp>
+      <p:sp>
+        <p:nvSpPr>
+          <p:cNvPr id="22" name="TextBox 21"/>
+          <p:cNvSpPr txBox="1"/>
+          <p:nvPr/>
+        </p:nvSpPr>
+        <p:spPr>
+          <a:xfrm>
+            <a:off x="1" y="6435277"/>
+            <a:ext cx="1014934" cy="307777"/>
+          </a:xfrm>
+          <a:prstGeom prst="rect">
+            <a:avLst/>
+          </a:prstGeom>
+          <a:noFill/>
+        </p:spPr>
+        <p:txBody>
+          <a:bodyPr wrap="none" rtlCol="0" anchor="ctr">
+            <a:spAutoFit/>
+          </a:bodyPr>
+          <a:lstStyle/>
+          <a:p>
+            <a:r>
+              <a:rPr lang="en-US" sz="1400" dirty="0" smtClean="0">
+                <a:solidFill>
+                  <a:schemeClr val="bg1">
+                    <a:lumMod val="85000"/>
+                  </a:schemeClr>
+                </a:solidFill>
+                <a:latin typeface="Rockwell"/>
+                <a:cs typeface="Rockwell"/>
+              </a:rPr>
+              <a:t>MCB 293S</a:t>
+            </a:r>
+          </a:p>
+        </p:txBody>
+      </p:sp>
+      <p:sp>
+        <p:nvSpPr>
+          <p:cNvPr id="23" name="TextBox 22"/>
+          <p:cNvSpPr txBox="1"/>
+          <p:nvPr/>
+        </p:nvSpPr>
+        <p:spPr>
+          <a:xfrm>
+            <a:off x="8344983" y="6435277"/>
+            <a:ext cx="799017" cy="307777"/>
+          </a:xfrm>
+          <a:prstGeom prst="rect">
+            <a:avLst/>
+          </a:prstGeom>
+          <a:noFill/>
+        </p:spPr>
+        <p:txBody>
+          <a:bodyPr wrap="none" rtlCol="0" anchor="ctr">
+            <a:spAutoFit/>
+          </a:bodyPr>
+          <a:lstStyle/>
+          <a:p>
+            <a:pPr algn="r"/>
+            <a:r>
+              <a:rPr lang="en-US" sz="1400" dirty="0" smtClean="0">
+                <a:solidFill>
+                  <a:schemeClr val="bg1">
+                    <a:lumMod val="85000"/>
+                  </a:schemeClr>
+                </a:solidFill>
+                <a:latin typeface="Rockwell"/>
+                <a:cs typeface="Rockwell"/>
+              </a:rPr>
+              <a:t>Week </a:t>
+            </a:r>
+            <a:r>
+              <a:rPr lang="en-US" sz="1400" dirty="0" smtClean="0">
+                <a:solidFill>
+                  <a:schemeClr val="bg1">
+                    <a:lumMod val="85000"/>
+                  </a:schemeClr>
+                </a:solidFill>
+                <a:latin typeface="Rockwell"/>
+                <a:cs typeface="Rockwell"/>
+              </a:rPr>
+              <a:t>4</a:t>
+            </a:r>
+            <a:endParaRPr lang="en-US" sz="1400" dirty="0" smtClean="0">
+              <a:solidFill>
+                <a:schemeClr val="bg1">
+                  <a:lumMod val="85000"/>
+                </a:schemeClr>
+              </a:solidFill>
+              <a:latin typeface="Rockwell"/>
+              <a:cs typeface="Rockwell"/>
             </a:endParaRPr>
           </a:p>
         </p:txBody>
@@ -7573,6 +8458,233 @@
           </a:p>
         </p:txBody>
       </p:sp>
+      <p:sp>
+        <p:nvSpPr>
+          <p:cNvPr id="10" name="Rectangle 9"/>
+          <p:cNvSpPr/>
+          <p:nvPr/>
+        </p:nvSpPr>
+        <p:spPr>
+          <a:xfrm>
+            <a:off x="3139571" y="6332355"/>
+            <a:ext cx="1428245" cy="539114"/>
+          </a:xfrm>
+          <a:prstGeom prst="rect">
+            <a:avLst/>
+          </a:prstGeom>
+          <a:solidFill>
+            <a:schemeClr val="accent3">
+              <a:lumMod val="50000"/>
+            </a:schemeClr>
+          </a:solidFill>
+          <a:ln>
+            <a:solidFill>
+              <a:srgbClr val="000000"/>
+            </a:solidFill>
+          </a:ln>
+          <a:effectLst/>
+        </p:spPr>
+        <p:style>
+          <a:lnRef idx="1">
+            <a:schemeClr val="accent1"/>
+          </a:lnRef>
+          <a:fillRef idx="3">
+            <a:schemeClr val="accent1"/>
+          </a:fillRef>
+          <a:effectRef idx="2">
+            <a:schemeClr val="accent1"/>
+          </a:effectRef>
+          <a:fontRef idx="minor">
+            <a:schemeClr val="lt1"/>
+          </a:fontRef>
+        </p:style>
+        <p:txBody>
+          <a:bodyPr rtlCol="0" anchor="ctr"/>
+          <a:lstStyle/>
+          <a:p>
+            <a:pPr algn="ctr"/>
+            <a:r>
+              <a:rPr lang="en-US" sz="1400" dirty="0" smtClean="0">
+                <a:solidFill>
+                  <a:srgbClr val="FFFFFF"/>
+                </a:solidFill>
+                <a:latin typeface="Rockwell"/>
+                <a:cs typeface="Rockwell"/>
+              </a:rPr>
+              <a:t>Multiple Linear Regression</a:t>
+            </a:r>
+            <a:endParaRPr lang="en-US" sz="1400" dirty="0">
+              <a:solidFill>
+                <a:srgbClr val="FFFFFF"/>
+              </a:solidFill>
+              <a:latin typeface="Rockwell"/>
+              <a:cs typeface="Rockwell"/>
+            </a:endParaRPr>
+          </a:p>
+        </p:txBody>
+      </p:sp>
+      <p:sp>
+        <p:nvSpPr>
+          <p:cNvPr id="11" name="Rectangle 10"/>
+          <p:cNvSpPr/>
+          <p:nvPr/>
+        </p:nvSpPr>
+        <p:spPr>
+          <a:xfrm>
+            <a:off x="4567817" y="6332355"/>
+            <a:ext cx="1428245" cy="539114"/>
+          </a:xfrm>
+          <a:prstGeom prst="rect">
+            <a:avLst/>
+          </a:prstGeom>
+          <a:solidFill>
+            <a:schemeClr val="accent3">
+              <a:lumMod val="60000"/>
+              <a:lumOff val="40000"/>
+            </a:schemeClr>
+          </a:solidFill>
+          <a:ln>
+            <a:solidFill>
+              <a:schemeClr val="tx1"/>
+            </a:solidFill>
+          </a:ln>
+          <a:effectLst/>
+        </p:spPr>
+        <p:style>
+          <a:lnRef idx="1">
+            <a:schemeClr val="accent1"/>
+          </a:lnRef>
+          <a:fillRef idx="3">
+            <a:schemeClr val="accent1"/>
+          </a:fillRef>
+          <a:effectRef idx="2">
+            <a:schemeClr val="accent1"/>
+          </a:effectRef>
+          <a:fontRef idx="minor">
+            <a:schemeClr val="lt1"/>
+          </a:fontRef>
+        </p:style>
+        <p:txBody>
+          <a:bodyPr rtlCol="0" anchor="ctr"/>
+          <a:lstStyle/>
+          <a:p>
+            <a:pPr algn="ctr"/>
+            <a:r>
+              <a:rPr lang="en-US" sz="1400" dirty="0" smtClean="0">
+                <a:solidFill>
+                  <a:srgbClr val="FFFFFF"/>
+                </a:solidFill>
+                <a:latin typeface="Rockwell"/>
+                <a:cs typeface="Rockwell"/>
+              </a:rPr>
+              <a:t>ANOVA</a:t>
+            </a:r>
+            <a:endParaRPr lang="en-US" sz="1400" dirty="0">
+              <a:solidFill>
+                <a:srgbClr val="FFFFFF"/>
+              </a:solidFill>
+              <a:latin typeface="Rockwell"/>
+              <a:cs typeface="Rockwell"/>
+            </a:endParaRPr>
+          </a:p>
+        </p:txBody>
+      </p:sp>
+      <p:sp>
+        <p:nvSpPr>
+          <p:cNvPr id="12" name="TextBox 11"/>
+          <p:cNvSpPr txBox="1"/>
+          <p:nvPr/>
+        </p:nvSpPr>
+        <p:spPr>
+          <a:xfrm>
+            <a:off x="1" y="6435277"/>
+            <a:ext cx="1014934" cy="307777"/>
+          </a:xfrm>
+          <a:prstGeom prst="rect">
+            <a:avLst/>
+          </a:prstGeom>
+          <a:noFill/>
+        </p:spPr>
+        <p:txBody>
+          <a:bodyPr wrap="none" rtlCol="0" anchor="ctr">
+            <a:spAutoFit/>
+          </a:bodyPr>
+          <a:lstStyle/>
+          <a:p>
+            <a:r>
+              <a:rPr lang="en-US" sz="1400" dirty="0" smtClean="0">
+                <a:solidFill>
+                  <a:schemeClr val="bg1">
+                    <a:lumMod val="85000"/>
+                  </a:schemeClr>
+                </a:solidFill>
+                <a:latin typeface="Rockwell"/>
+                <a:cs typeface="Rockwell"/>
+              </a:rPr>
+              <a:t>MCB 293S</a:t>
+            </a:r>
+          </a:p>
+        </p:txBody>
+      </p:sp>
+      <p:sp>
+        <p:nvSpPr>
+          <p:cNvPr id="13" name="TextBox 12"/>
+          <p:cNvSpPr txBox="1"/>
+          <p:nvPr/>
+        </p:nvSpPr>
+        <p:spPr>
+          <a:xfrm>
+            <a:off x="8344983" y="6435277"/>
+            <a:ext cx="799017" cy="307777"/>
+          </a:xfrm>
+          <a:prstGeom prst="rect">
+            <a:avLst/>
+          </a:prstGeom>
+          <a:noFill/>
+        </p:spPr>
+        <p:txBody>
+          <a:bodyPr wrap="none" rtlCol="0" anchor="ctr">
+            <a:spAutoFit/>
+          </a:bodyPr>
+          <a:lstStyle/>
+          <a:p>
+            <a:pPr algn="r"/>
+            <a:r>
+              <a:rPr lang="en-US" sz="1400" dirty="0" smtClean="0">
+                <a:solidFill>
+                  <a:schemeClr val="bg1">
+                    <a:lumMod val="85000"/>
+                  </a:schemeClr>
+                </a:solidFill>
+                <a:latin typeface="Rockwell"/>
+                <a:cs typeface="Rockwell"/>
+              </a:rPr>
+              <a:t>Week </a:t>
+            </a:r>
+            <a:r>
+              <a:rPr lang="en-US" sz="1400" dirty="0" smtClean="0">
+                <a:solidFill>
+                  <a:schemeClr val="bg1">
+                    <a:lumMod val="85000"/>
+                  </a:schemeClr>
+                </a:solidFill>
+                <a:latin typeface="Rockwell"/>
+                <a:cs typeface="Rockwell"/>
+              </a:rPr>
+              <a:t>4</a:t>
+            </a:r>
+            <a:endParaRPr lang="en-US" sz="1400" dirty="0" smtClean="0">
+              <a:solidFill>
+                <a:schemeClr val="bg1">
+                  <a:lumMod val="85000"/>
+                </a:schemeClr>
+              </a:solidFill>
+              <a:latin typeface="Rockwell"/>
+              <a:cs typeface="Rockwell"/>
+            </a:endParaRPr>
+          </a:p>
+        </p:txBody>
+      </p:sp>
     </p:spTree>
     <p:extLst>
       <p:ext uri="{BB962C8B-B14F-4D97-AF65-F5344CB8AC3E}">
@@ -8182,6 +9294,233 @@
           </a:p>
         </p:txBody>
       </p:sp>
+      <p:sp>
+        <p:nvSpPr>
+          <p:cNvPr id="17" name="Rectangle 16"/>
+          <p:cNvSpPr/>
+          <p:nvPr/>
+        </p:nvSpPr>
+        <p:spPr>
+          <a:xfrm>
+            <a:off x="3139571" y="6332355"/>
+            <a:ext cx="1428245" cy="539114"/>
+          </a:xfrm>
+          <a:prstGeom prst="rect">
+            <a:avLst/>
+          </a:prstGeom>
+          <a:solidFill>
+            <a:schemeClr val="accent3">
+              <a:lumMod val="50000"/>
+            </a:schemeClr>
+          </a:solidFill>
+          <a:ln>
+            <a:solidFill>
+              <a:srgbClr val="000000"/>
+            </a:solidFill>
+          </a:ln>
+          <a:effectLst/>
+        </p:spPr>
+        <p:style>
+          <a:lnRef idx="1">
+            <a:schemeClr val="accent1"/>
+          </a:lnRef>
+          <a:fillRef idx="3">
+            <a:schemeClr val="accent1"/>
+          </a:fillRef>
+          <a:effectRef idx="2">
+            <a:schemeClr val="accent1"/>
+          </a:effectRef>
+          <a:fontRef idx="minor">
+            <a:schemeClr val="lt1"/>
+          </a:fontRef>
+        </p:style>
+        <p:txBody>
+          <a:bodyPr rtlCol="0" anchor="ctr"/>
+          <a:lstStyle/>
+          <a:p>
+            <a:pPr algn="ctr"/>
+            <a:r>
+              <a:rPr lang="en-US" sz="1400" dirty="0" smtClean="0">
+                <a:solidFill>
+                  <a:srgbClr val="FFFFFF"/>
+                </a:solidFill>
+                <a:latin typeface="Rockwell"/>
+                <a:cs typeface="Rockwell"/>
+              </a:rPr>
+              <a:t>Multiple Linear Regression</a:t>
+            </a:r>
+            <a:endParaRPr lang="en-US" sz="1400" dirty="0">
+              <a:solidFill>
+                <a:srgbClr val="FFFFFF"/>
+              </a:solidFill>
+              <a:latin typeface="Rockwell"/>
+              <a:cs typeface="Rockwell"/>
+            </a:endParaRPr>
+          </a:p>
+        </p:txBody>
+      </p:sp>
+      <p:sp>
+        <p:nvSpPr>
+          <p:cNvPr id="18" name="Rectangle 17"/>
+          <p:cNvSpPr/>
+          <p:nvPr/>
+        </p:nvSpPr>
+        <p:spPr>
+          <a:xfrm>
+            <a:off x="4567817" y="6332355"/>
+            <a:ext cx="1428245" cy="539114"/>
+          </a:xfrm>
+          <a:prstGeom prst="rect">
+            <a:avLst/>
+          </a:prstGeom>
+          <a:solidFill>
+            <a:schemeClr val="accent3">
+              <a:lumMod val="60000"/>
+              <a:lumOff val="40000"/>
+            </a:schemeClr>
+          </a:solidFill>
+          <a:ln>
+            <a:solidFill>
+              <a:schemeClr val="tx1"/>
+            </a:solidFill>
+          </a:ln>
+          <a:effectLst/>
+        </p:spPr>
+        <p:style>
+          <a:lnRef idx="1">
+            <a:schemeClr val="accent1"/>
+          </a:lnRef>
+          <a:fillRef idx="3">
+            <a:schemeClr val="accent1"/>
+          </a:fillRef>
+          <a:effectRef idx="2">
+            <a:schemeClr val="accent1"/>
+          </a:effectRef>
+          <a:fontRef idx="minor">
+            <a:schemeClr val="lt1"/>
+          </a:fontRef>
+        </p:style>
+        <p:txBody>
+          <a:bodyPr rtlCol="0" anchor="ctr"/>
+          <a:lstStyle/>
+          <a:p>
+            <a:pPr algn="ctr"/>
+            <a:r>
+              <a:rPr lang="en-US" sz="1400" dirty="0" smtClean="0">
+                <a:solidFill>
+                  <a:srgbClr val="FFFFFF"/>
+                </a:solidFill>
+                <a:latin typeface="Rockwell"/>
+                <a:cs typeface="Rockwell"/>
+              </a:rPr>
+              <a:t>ANOVA</a:t>
+            </a:r>
+            <a:endParaRPr lang="en-US" sz="1400" dirty="0">
+              <a:solidFill>
+                <a:srgbClr val="FFFFFF"/>
+              </a:solidFill>
+              <a:latin typeface="Rockwell"/>
+              <a:cs typeface="Rockwell"/>
+            </a:endParaRPr>
+          </a:p>
+        </p:txBody>
+      </p:sp>
+      <p:sp>
+        <p:nvSpPr>
+          <p:cNvPr id="19" name="TextBox 18"/>
+          <p:cNvSpPr txBox="1"/>
+          <p:nvPr/>
+        </p:nvSpPr>
+        <p:spPr>
+          <a:xfrm>
+            <a:off x="1" y="6435277"/>
+            <a:ext cx="1014934" cy="307777"/>
+          </a:xfrm>
+          <a:prstGeom prst="rect">
+            <a:avLst/>
+          </a:prstGeom>
+          <a:noFill/>
+        </p:spPr>
+        <p:txBody>
+          <a:bodyPr wrap="none" rtlCol="0" anchor="ctr">
+            <a:spAutoFit/>
+          </a:bodyPr>
+          <a:lstStyle/>
+          <a:p>
+            <a:r>
+              <a:rPr lang="en-US" sz="1400" dirty="0" smtClean="0">
+                <a:solidFill>
+                  <a:schemeClr val="bg1">
+                    <a:lumMod val="85000"/>
+                  </a:schemeClr>
+                </a:solidFill>
+                <a:latin typeface="Rockwell"/>
+                <a:cs typeface="Rockwell"/>
+              </a:rPr>
+              <a:t>MCB 293S</a:t>
+            </a:r>
+          </a:p>
+        </p:txBody>
+      </p:sp>
+      <p:sp>
+        <p:nvSpPr>
+          <p:cNvPr id="22" name="TextBox 21"/>
+          <p:cNvSpPr txBox="1"/>
+          <p:nvPr/>
+        </p:nvSpPr>
+        <p:spPr>
+          <a:xfrm>
+            <a:off x="8344983" y="6435277"/>
+            <a:ext cx="799017" cy="307777"/>
+          </a:xfrm>
+          <a:prstGeom prst="rect">
+            <a:avLst/>
+          </a:prstGeom>
+          <a:noFill/>
+        </p:spPr>
+        <p:txBody>
+          <a:bodyPr wrap="none" rtlCol="0" anchor="ctr">
+            <a:spAutoFit/>
+          </a:bodyPr>
+          <a:lstStyle/>
+          <a:p>
+            <a:pPr algn="r"/>
+            <a:r>
+              <a:rPr lang="en-US" sz="1400" dirty="0" smtClean="0">
+                <a:solidFill>
+                  <a:schemeClr val="bg1">
+                    <a:lumMod val="85000"/>
+                  </a:schemeClr>
+                </a:solidFill>
+                <a:latin typeface="Rockwell"/>
+                <a:cs typeface="Rockwell"/>
+              </a:rPr>
+              <a:t>Week </a:t>
+            </a:r>
+            <a:r>
+              <a:rPr lang="en-US" sz="1400" dirty="0" smtClean="0">
+                <a:solidFill>
+                  <a:schemeClr val="bg1">
+                    <a:lumMod val="85000"/>
+                  </a:schemeClr>
+                </a:solidFill>
+                <a:latin typeface="Rockwell"/>
+                <a:cs typeface="Rockwell"/>
+              </a:rPr>
+              <a:t>4</a:t>
+            </a:r>
+            <a:endParaRPr lang="en-US" sz="1400" dirty="0" smtClean="0">
+              <a:solidFill>
+                <a:schemeClr val="bg1">
+                  <a:lumMod val="85000"/>
+                </a:schemeClr>
+              </a:solidFill>
+              <a:latin typeface="Rockwell"/>
+              <a:cs typeface="Rockwell"/>
+            </a:endParaRPr>
+          </a:p>
+        </p:txBody>
+      </p:sp>
     </p:spTree>
     <p:extLst>
       <p:ext uri="{BB962C8B-B14F-4D97-AF65-F5344CB8AC3E}">
@@ -9076,6 +10415,233 @@
             <a:endParaRPr lang="en-US" sz="1600" dirty="0">
               <a:latin typeface="Helvetica"/>
               <a:cs typeface="Helvetica"/>
+            </a:endParaRPr>
+          </a:p>
+        </p:txBody>
+      </p:sp>
+      <p:sp>
+        <p:nvSpPr>
+          <p:cNvPr id="13" name="Rectangle 12"/>
+          <p:cNvSpPr/>
+          <p:nvPr/>
+        </p:nvSpPr>
+        <p:spPr>
+          <a:xfrm>
+            <a:off x="3139571" y="6332355"/>
+            <a:ext cx="1428245" cy="539114"/>
+          </a:xfrm>
+          <a:prstGeom prst="rect">
+            <a:avLst/>
+          </a:prstGeom>
+          <a:solidFill>
+            <a:schemeClr val="accent3">
+              <a:lumMod val="60000"/>
+              <a:lumOff val="40000"/>
+            </a:schemeClr>
+          </a:solidFill>
+          <a:ln>
+            <a:solidFill>
+              <a:srgbClr val="000000"/>
+            </a:solidFill>
+          </a:ln>
+          <a:effectLst/>
+        </p:spPr>
+        <p:style>
+          <a:lnRef idx="1">
+            <a:schemeClr val="accent1"/>
+          </a:lnRef>
+          <a:fillRef idx="3">
+            <a:schemeClr val="accent1"/>
+          </a:fillRef>
+          <a:effectRef idx="2">
+            <a:schemeClr val="accent1"/>
+          </a:effectRef>
+          <a:fontRef idx="minor">
+            <a:schemeClr val="lt1"/>
+          </a:fontRef>
+        </p:style>
+        <p:txBody>
+          <a:bodyPr rtlCol="0" anchor="ctr"/>
+          <a:lstStyle/>
+          <a:p>
+            <a:pPr algn="ctr"/>
+            <a:r>
+              <a:rPr lang="en-US" sz="1400" dirty="0" smtClean="0">
+                <a:solidFill>
+                  <a:srgbClr val="FFFFFF"/>
+                </a:solidFill>
+                <a:latin typeface="Rockwell"/>
+                <a:cs typeface="Rockwell"/>
+              </a:rPr>
+              <a:t>Multiple Linear Regression</a:t>
+            </a:r>
+            <a:endParaRPr lang="en-US" sz="1400" dirty="0">
+              <a:solidFill>
+                <a:srgbClr val="FFFFFF"/>
+              </a:solidFill>
+              <a:latin typeface="Rockwell"/>
+              <a:cs typeface="Rockwell"/>
+            </a:endParaRPr>
+          </a:p>
+        </p:txBody>
+      </p:sp>
+      <p:sp>
+        <p:nvSpPr>
+          <p:cNvPr id="14" name="Rectangle 13"/>
+          <p:cNvSpPr/>
+          <p:nvPr/>
+        </p:nvSpPr>
+        <p:spPr>
+          <a:xfrm>
+            <a:off x="4567817" y="6332355"/>
+            <a:ext cx="1428245" cy="539114"/>
+          </a:xfrm>
+          <a:prstGeom prst="rect">
+            <a:avLst/>
+          </a:prstGeom>
+          <a:solidFill>
+            <a:schemeClr val="accent3">
+              <a:lumMod val="50000"/>
+            </a:schemeClr>
+          </a:solidFill>
+          <a:ln>
+            <a:solidFill>
+              <a:schemeClr val="tx1"/>
+            </a:solidFill>
+          </a:ln>
+          <a:effectLst/>
+        </p:spPr>
+        <p:style>
+          <a:lnRef idx="1">
+            <a:schemeClr val="accent1"/>
+          </a:lnRef>
+          <a:fillRef idx="3">
+            <a:schemeClr val="accent1"/>
+          </a:fillRef>
+          <a:effectRef idx="2">
+            <a:schemeClr val="accent1"/>
+          </a:effectRef>
+          <a:fontRef idx="minor">
+            <a:schemeClr val="lt1"/>
+          </a:fontRef>
+        </p:style>
+        <p:txBody>
+          <a:bodyPr rtlCol="0" anchor="ctr"/>
+          <a:lstStyle/>
+          <a:p>
+            <a:pPr algn="ctr"/>
+            <a:r>
+              <a:rPr lang="en-US" sz="1400" dirty="0" smtClean="0">
+                <a:solidFill>
+                  <a:srgbClr val="FFFFFF"/>
+                </a:solidFill>
+                <a:latin typeface="Rockwell"/>
+                <a:cs typeface="Rockwell"/>
+              </a:rPr>
+              <a:t>ANOVA</a:t>
+            </a:r>
+            <a:endParaRPr lang="en-US" sz="1400" dirty="0">
+              <a:solidFill>
+                <a:srgbClr val="FFFFFF"/>
+              </a:solidFill>
+              <a:latin typeface="Rockwell"/>
+              <a:cs typeface="Rockwell"/>
+            </a:endParaRPr>
+          </a:p>
+        </p:txBody>
+      </p:sp>
+      <p:sp>
+        <p:nvSpPr>
+          <p:cNvPr id="15" name="TextBox 14"/>
+          <p:cNvSpPr txBox="1"/>
+          <p:nvPr/>
+        </p:nvSpPr>
+        <p:spPr>
+          <a:xfrm>
+            <a:off x="1" y="6435277"/>
+            <a:ext cx="1014934" cy="307777"/>
+          </a:xfrm>
+          <a:prstGeom prst="rect">
+            <a:avLst/>
+          </a:prstGeom>
+          <a:noFill/>
+        </p:spPr>
+        <p:txBody>
+          <a:bodyPr wrap="none" rtlCol="0" anchor="ctr">
+            <a:spAutoFit/>
+          </a:bodyPr>
+          <a:lstStyle/>
+          <a:p>
+            <a:r>
+              <a:rPr lang="en-US" sz="1400" dirty="0" smtClean="0">
+                <a:solidFill>
+                  <a:schemeClr val="bg1">
+                    <a:lumMod val="85000"/>
+                  </a:schemeClr>
+                </a:solidFill>
+                <a:latin typeface="Rockwell"/>
+                <a:cs typeface="Rockwell"/>
+              </a:rPr>
+              <a:t>MCB 293S</a:t>
+            </a:r>
+          </a:p>
+        </p:txBody>
+      </p:sp>
+      <p:sp>
+        <p:nvSpPr>
+          <p:cNvPr id="22" name="TextBox 21"/>
+          <p:cNvSpPr txBox="1"/>
+          <p:nvPr/>
+        </p:nvSpPr>
+        <p:spPr>
+          <a:xfrm>
+            <a:off x="8344983" y="6435277"/>
+            <a:ext cx="799017" cy="307777"/>
+          </a:xfrm>
+          <a:prstGeom prst="rect">
+            <a:avLst/>
+          </a:prstGeom>
+          <a:noFill/>
+        </p:spPr>
+        <p:txBody>
+          <a:bodyPr wrap="none" rtlCol="0" anchor="ctr">
+            <a:spAutoFit/>
+          </a:bodyPr>
+          <a:lstStyle/>
+          <a:p>
+            <a:pPr algn="r"/>
+            <a:r>
+              <a:rPr lang="en-US" sz="1400" dirty="0" smtClean="0">
+                <a:solidFill>
+                  <a:schemeClr val="bg1">
+                    <a:lumMod val="85000"/>
+                  </a:schemeClr>
+                </a:solidFill>
+                <a:latin typeface="Rockwell"/>
+                <a:cs typeface="Rockwell"/>
+              </a:rPr>
+              <a:t>Week </a:t>
+            </a:r>
+            <a:r>
+              <a:rPr lang="en-US" sz="1400" dirty="0" smtClean="0">
+                <a:solidFill>
+                  <a:schemeClr val="bg1">
+                    <a:lumMod val="85000"/>
+                  </a:schemeClr>
+                </a:solidFill>
+                <a:latin typeface="Rockwell"/>
+                <a:cs typeface="Rockwell"/>
+              </a:rPr>
+              <a:t>4</a:t>
+            </a:r>
+            <a:endParaRPr lang="en-US" sz="1400" dirty="0" smtClean="0">
+              <a:solidFill>
+                <a:schemeClr val="bg1">
+                  <a:lumMod val="85000"/>
+                </a:schemeClr>
+              </a:solidFill>
+              <a:latin typeface="Rockwell"/>
+              <a:cs typeface="Rockwell"/>
             </a:endParaRPr>
           </a:p>
         </p:txBody>
@@ -9849,6 +11415,233 @@
           </a:p>
         </p:txBody>
       </p:sp>
+      <p:sp>
+        <p:nvSpPr>
+          <p:cNvPr id="16" name="Rectangle 15"/>
+          <p:cNvSpPr/>
+          <p:nvPr/>
+        </p:nvSpPr>
+        <p:spPr>
+          <a:xfrm>
+            <a:off x="3139571" y="6332355"/>
+            <a:ext cx="1428245" cy="539114"/>
+          </a:xfrm>
+          <a:prstGeom prst="rect">
+            <a:avLst/>
+          </a:prstGeom>
+          <a:solidFill>
+            <a:schemeClr val="accent3">
+              <a:lumMod val="60000"/>
+              <a:lumOff val="40000"/>
+            </a:schemeClr>
+          </a:solidFill>
+          <a:ln>
+            <a:solidFill>
+              <a:srgbClr val="000000"/>
+            </a:solidFill>
+          </a:ln>
+          <a:effectLst/>
+        </p:spPr>
+        <p:style>
+          <a:lnRef idx="1">
+            <a:schemeClr val="accent1"/>
+          </a:lnRef>
+          <a:fillRef idx="3">
+            <a:schemeClr val="accent1"/>
+          </a:fillRef>
+          <a:effectRef idx="2">
+            <a:schemeClr val="accent1"/>
+          </a:effectRef>
+          <a:fontRef idx="minor">
+            <a:schemeClr val="lt1"/>
+          </a:fontRef>
+        </p:style>
+        <p:txBody>
+          <a:bodyPr rtlCol="0" anchor="ctr"/>
+          <a:lstStyle/>
+          <a:p>
+            <a:pPr algn="ctr"/>
+            <a:r>
+              <a:rPr lang="en-US" sz="1400" dirty="0" smtClean="0">
+                <a:solidFill>
+                  <a:srgbClr val="FFFFFF"/>
+                </a:solidFill>
+                <a:latin typeface="Rockwell"/>
+                <a:cs typeface="Rockwell"/>
+              </a:rPr>
+              <a:t>Multiple Linear Regression</a:t>
+            </a:r>
+            <a:endParaRPr lang="en-US" sz="1400" dirty="0">
+              <a:solidFill>
+                <a:srgbClr val="FFFFFF"/>
+              </a:solidFill>
+              <a:latin typeface="Rockwell"/>
+              <a:cs typeface="Rockwell"/>
+            </a:endParaRPr>
+          </a:p>
+        </p:txBody>
+      </p:sp>
+      <p:sp>
+        <p:nvSpPr>
+          <p:cNvPr id="17" name="Rectangle 16"/>
+          <p:cNvSpPr/>
+          <p:nvPr/>
+        </p:nvSpPr>
+        <p:spPr>
+          <a:xfrm>
+            <a:off x="4567817" y="6332355"/>
+            <a:ext cx="1428245" cy="539114"/>
+          </a:xfrm>
+          <a:prstGeom prst="rect">
+            <a:avLst/>
+          </a:prstGeom>
+          <a:solidFill>
+            <a:schemeClr val="accent3">
+              <a:lumMod val="50000"/>
+            </a:schemeClr>
+          </a:solidFill>
+          <a:ln>
+            <a:solidFill>
+              <a:schemeClr val="tx1"/>
+            </a:solidFill>
+          </a:ln>
+          <a:effectLst/>
+        </p:spPr>
+        <p:style>
+          <a:lnRef idx="1">
+            <a:schemeClr val="accent1"/>
+          </a:lnRef>
+          <a:fillRef idx="3">
+            <a:schemeClr val="accent1"/>
+          </a:fillRef>
+          <a:effectRef idx="2">
+            <a:schemeClr val="accent1"/>
+          </a:effectRef>
+          <a:fontRef idx="minor">
+            <a:schemeClr val="lt1"/>
+          </a:fontRef>
+        </p:style>
+        <p:txBody>
+          <a:bodyPr rtlCol="0" anchor="ctr"/>
+          <a:lstStyle/>
+          <a:p>
+            <a:pPr algn="ctr"/>
+            <a:r>
+              <a:rPr lang="en-US" sz="1400" dirty="0" smtClean="0">
+                <a:solidFill>
+                  <a:srgbClr val="FFFFFF"/>
+                </a:solidFill>
+                <a:latin typeface="Rockwell"/>
+                <a:cs typeface="Rockwell"/>
+              </a:rPr>
+              <a:t>ANOVA</a:t>
+            </a:r>
+            <a:endParaRPr lang="en-US" sz="1400" dirty="0">
+              <a:solidFill>
+                <a:srgbClr val="FFFFFF"/>
+              </a:solidFill>
+              <a:latin typeface="Rockwell"/>
+              <a:cs typeface="Rockwell"/>
+            </a:endParaRPr>
+          </a:p>
+        </p:txBody>
+      </p:sp>
+      <p:sp>
+        <p:nvSpPr>
+          <p:cNvPr id="18" name="TextBox 17"/>
+          <p:cNvSpPr txBox="1"/>
+          <p:nvPr/>
+        </p:nvSpPr>
+        <p:spPr>
+          <a:xfrm>
+            <a:off x="1" y="6435277"/>
+            <a:ext cx="1014934" cy="307777"/>
+          </a:xfrm>
+          <a:prstGeom prst="rect">
+            <a:avLst/>
+          </a:prstGeom>
+          <a:noFill/>
+        </p:spPr>
+        <p:txBody>
+          <a:bodyPr wrap="none" rtlCol="0" anchor="ctr">
+            <a:spAutoFit/>
+          </a:bodyPr>
+          <a:lstStyle/>
+          <a:p>
+            <a:r>
+              <a:rPr lang="en-US" sz="1400" dirty="0" smtClean="0">
+                <a:solidFill>
+                  <a:schemeClr val="bg1">
+                    <a:lumMod val="85000"/>
+                  </a:schemeClr>
+                </a:solidFill>
+                <a:latin typeface="Rockwell"/>
+                <a:cs typeface="Rockwell"/>
+              </a:rPr>
+              <a:t>MCB 293S</a:t>
+            </a:r>
+          </a:p>
+        </p:txBody>
+      </p:sp>
+      <p:sp>
+        <p:nvSpPr>
+          <p:cNvPr id="19" name="TextBox 18"/>
+          <p:cNvSpPr txBox="1"/>
+          <p:nvPr/>
+        </p:nvSpPr>
+        <p:spPr>
+          <a:xfrm>
+            <a:off x="8344983" y="6435277"/>
+            <a:ext cx="799017" cy="307777"/>
+          </a:xfrm>
+          <a:prstGeom prst="rect">
+            <a:avLst/>
+          </a:prstGeom>
+          <a:noFill/>
+        </p:spPr>
+        <p:txBody>
+          <a:bodyPr wrap="none" rtlCol="0" anchor="ctr">
+            <a:spAutoFit/>
+          </a:bodyPr>
+          <a:lstStyle/>
+          <a:p>
+            <a:pPr algn="r"/>
+            <a:r>
+              <a:rPr lang="en-US" sz="1400" dirty="0" smtClean="0">
+                <a:solidFill>
+                  <a:schemeClr val="bg1">
+                    <a:lumMod val="85000"/>
+                  </a:schemeClr>
+                </a:solidFill>
+                <a:latin typeface="Rockwell"/>
+                <a:cs typeface="Rockwell"/>
+              </a:rPr>
+              <a:t>Week </a:t>
+            </a:r>
+            <a:r>
+              <a:rPr lang="en-US" sz="1400" dirty="0" smtClean="0">
+                <a:solidFill>
+                  <a:schemeClr val="bg1">
+                    <a:lumMod val="85000"/>
+                  </a:schemeClr>
+                </a:solidFill>
+                <a:latin typeface="Rockwell"/>
+                <a:cs typeface="Rockwell"/>
+              </a:rPr>
+              <a:t>4</a:t>
+            </a:r>
+            <a:endParaRPr lang="en-US" sz="1400" dirty="0" smtClean="0">
+              <a:solidFill>
+                <a:schemeClr val="bg1">
+                  <a:lumMod val="85000"/>
+                </a:schemeClr>
+              </a:solidFill>
+              <a:latin typeface="Rockwell"/>
+              <a:cs typeface="Rockwell"/>
+            </a:endParaRPr>
+          </a:p>
+        </p:txBody>
+      </p:sp>
     </p:spTree>
     <p:extLst>
       <p:ext uri="{BB962C8B-B14F-4D97-AF65-F5344CB8AC3E}">
@@ -10253,6 +12046,233 @@
           </a:p>
         </p:txBody>
       </p:sp>
+      <p:sp>
+        <p:nvSpPr>
+          <p:cNvPr id="8" name="Rectangle 7"/>
+          <p:cNvSpPr/>
+          <p:nvPr/>
+        </p:nvSpPr>
+        <p:spPr>
+          <a:xfrm>
+            <a:off x="3139571" y="6332355"/>
+            <a:ext cx="1428245" cy="539114"/>
+          </a:xfrm>
+          <a:prstGeom prst="rect">
+            <a:avLst/>
+          </a:prstGeom>
+          <a:solidFill>
+            <a:schemeClr val="accent3">
+              <a:lumMod val="60000"/>
+              <a:lumOff val="40000"/>
+            </a:schemeClr>
+          </a:solidFill>
+          <a:ln>
+            <a:solidFill>
+              <a:srgbClr val="000000"/>
+            </a:solidFill>
+          </a:ln>
+          <a:effectLst/>
+        </p:spPr>
+        <p:style>
+          <a:lnRef idx="1">
+            <a:schemeClr val="accent1"/>
+          </a:lnRef>
+          <a:fillRef idx="3">
+            <a:schemeClr val="accent1"/>
+          </a:fillRef>
+          <a:effectRef idx="2">
+            <a:schemeClr val="accent1"/>
+          </a:effectRef>
+          <a:fontRef idx="minor">
+            <a:schemeClr val="lt1"/>
+          </a:fontRef>
+        </p:style>
+        <p:txBody>
+          <a:bodyPr rtlCol="0" anchor="ctr"/>
+          <a:lstStyle/>
+          <a:p>
+            <a:pPr algn="ctr"/>
+            <a:r>
+              <a:rPr lang="en-US" sz="1400" dirty="0" smtClean="0">
+                <a:solidFill>
+                  <a:srgbClr val="FFFFFF"/>
+                </a:solidFill>
+                <a:latin typeface="Rockwell"/>
+                <a:cs typeface="Rockwell"/>
+              </a:rPr>
+              <a:t>Multiple Linear Regression</a:t>
+            </a:r>
+            <a:endParaRPr lang="en-US" sz="1400" dirty="0">
+              <a:solidFill>
+                <a:srgbClr val="FFFFFF"/>
+              </a:solidFill>
+              <a:latin typeface="Rockwell"/>
+              <a:cs typeface="Rockwell"/>
+            </a:endParaRPr>
+          </a:p>
+        </p:txBody>
+      </p:sp>
+      <p:sp>
+        <p:nvSpPr>
+          <p:cNvPr id="10" name="Rectangle 9"/>
+          <p:cNvSpPr/>
+          <p:nvPr/>
+        </p:nvSpPr>
+        <p:spPr>
+          <a:xfrm>
+            <a:off x="4567817" y="6332355"/>
+            <a:ext cx="1428245" cy="539114"/>
+          </a:xfrm>
+          <a:prstGeom prst="rect">
+            <a:avLst/>
+          </a:prstGeom>
+          <a:solidFill>
+            <a:schemeClr val="accent3">
+              <a:lumMod val="50000"/>
+            </a:schemeClr>
+          </a:solidFill>
+          <a:ln>
+            <a:solidFill>
+              <a:schemeClr val="tx1"/>
+            </a:solidFill>
+          </a:ln>
+          <a:effectLst/>
+        </p:spPr>
+        <p:style>
+          <a:lnRef idx="1">
+            <a:schemeClr val="accent1"/>
+          </a:lnRef>
+          <a:fillRef idx="3">
+            <a:schemeClr val="accent1"/>
+          </a:fillRef>
+          <a:effectRef idx="2">
+            <a:schemeClr val="accent1"/>
+          </a:effectRef>
+          <a:fontRef idx="minor">
+            <a:schemeClr val="lt1"/>
+          </a:fontRef>
+        </p:style>
+        <p:txBody>
+          <a:bodyPr rtlCol="0" anchor="ctr"/>
+          <a:lstStyle/>
+          <a:p>
+            <a:pPr algn="ctr"/>
+            <a:r>
+              <a:rPr lang="en-US" sz="1400" dirty="0" smtClean="0">
+                <a:solidFill>
+                  <a:srgbClr val="FFFFFF"/>
+                </a:solidFill>
+                <a:latin typeface="Rockwell"/>
+                <a:cs typeface="Rockwell"/>
+              </a:rPr>
+              <a:t>ANOVA</a:t>
+            </a:r>
+            <a:endParaRPr lang="en-US" sz="1400" dirty="0">
+              <a:solidFill>
+                <a:srgbClr val="FFFFFF"/>
+              </a:solidFill>
+              <a:latin typeface="Rockwell"/>
+              <a:cs typeface="Rockwell"/>
+            </a:endParaRPr>
+          </a:p>
+        </p:txBody>
+      </p:sp>
+      <p:sp>
+        <p:nvSpPr>
+          <p:cNvPr id="11" name="TextBox 10"/>
+          <p:cNvSpPr txBox="1"/>
+          <p:nvPr/>
+        </p:nvSpPr>
+        <p:spPr>
+          <a:xfrm>
+            <a:off x="1" y="6435277"/>
+            <a:ext cx="1014934" cy="307777"/>
+          </a:xfrm>
+          <a:prstGeom prst="rect">
+            <a:avLst/>
+          </a:prstGeom>
+          <a:noFill/>
+        </p:spPr>
+        <p:txBody>
+          <a:bodyPr wrap="none" rtlCol="0" anchor="ctr">
+            <a:spAutoFit/>
+          </a:bodyPr>
+          <a:lstStyle/>
+          <a:p>
+            <a:r>
+              <a:rPr lang="en-US" sz="1400" dirty="0" smtClean="0">
+                <a:solidFill>
+                  <a:schemeClr val="bg1">
+                    <a:lumMod val="85000"/>
+                  </a:schemeClr>
+                </a:solidFill>
+                <a:latin typeface="Rockwell"/>
+                <a:cs typeface="Rockwell"/>
+              </a:rPr>
+              <a:t>MCB 293S</a:t>
+            </a:r>
+          </a:p>
+        </p:txBody>
+      </p:sp>
+      <p:sp>
+        <p:nvSpPr>
+          <p:cNvPr id="12" name="TextBox 11"/>
+          <p:cNvSpPr txBox="1"/>
+          <p:nvPr/>
+        </p:nvSpPr>
+        <p:spPr>
+          <a:xfrm>
+            <a:off x="8344983" y="6435277"/>
+            <a:ext cx="799017" cy="307777"/>
+          </a:xfrm>
+          <a:prstGeom prst="rect">
+            <a:avLst/>
+          </a:prstGeom>
+          <a:noFill/>
+        </p:spPr>
+        <p:txBody>
+          <a:bodyPr wrap="none" rtlCol="0" anchor="ctr">
+            <a:spAutoFit/>
+          </a:bodyPr>
+          <a:lstStyle/>
+          <a:p>
+            <a:pPr algn="r"/>
+            <a:r>
+              <a:rPr lang="en-US" sz="1400" dirty="0" smtClean="0">
+                <a:solidFill>
+                  <a:schemeClr val="bg1">
+                    <a:lumMod val="85000"/>
+                  </a:schemeClr>
+                </a:solidFill>
+                <a:latin typeface="Rockwell"/>
+                <a:cs typeface="Rockwell"/>
+              </a:rPr>
+              <a:t>Week </a:t>
+            </a:r>
+            <a:r>
+              <a:rPr lang="en-US" sz="1400" dirty="0" smtClean="0">
+                <a:solidFill>
+                  <a:schemeClr val="bg1">
+                    <a:lumMod val="85000"/>
+                  </a:schemeClr>
+                </a:solidFill>
+                <a:latin typeface="Rockwell"/>
+                <a:cs typeface="Rockwell"/>
+              </a:rPr>
+              <a:t>4</a:t>
+            </a:r>
+            <a:endParaRPr lang="en-US" sz="1400" dirty="0" smtClean="0">
+              <a:solidFill>
+                <a:schemeClr val="bg1">
+                  <a:lumMod val="85000"/>
+                </a:schemeClr>
+              </a:solidFill>
+              <a:latin typeface="Rockwell"/>
+              <a:cs typeface="Rockwell"/>
+            </a:endParaRPr>
+          </a:p>
+        </p:txBody>
+      </p:sp>
     </p:spTree>
     <p:extLst>
       <p:ext uri="{BB962C8B-B14F-4D97-AF65-F5344CB8AC3E}">
@@ -10763,6 +12783,233 @@
               </a:solidFill>
               <a:latin typeface="Consolas"/>
               <a:cs typeface="Consolas"/>
+            </a:endParaRPr>
+          </a:p>
+        </p:txBody>
+      </p:sp>
+      <p:sp>
+        <p:nvSpPr>
+          <p:cNvPr id="8" name="Rectangle 7"/>
+          <p:cNvSpPr/>
+          <p:nvPr/>
+        </p:nvSpPr>
+        <p:spPr>
+          <a:xfrm>
+            <a:off x="3139571" y="6332355"/>
+            <a:ext cx="1428245" cy="539114"/>
+          </a:xfrm>
+          <a:prstGeom prst="rect">
+            <a:avLst/>
+          </a:prstGeom>
+          <a:solidFill>
+            <a:schemeClr val="accent3">
+              <a:lumMod val="60000"/>
+              <a:lumOff val="40000"/>
+            </a:schemeClr>
+          </a:solidFill>
+          <a:ln>
+            <a:solidFill>
+              <a:srgbClr val="000000"/>
+            </a:solidFill>
+          </a:ln>
+          <a:effectLst/>
+        </p:spPr>
+        <p:style>
+          <a:lnRef idx="1">
+            <a:schemeClr val="accent1"/>
+          </a:lnRef>
+          <a:fillRef idx="3">
+            <a:schemeClr val="accent1"/>
+          </a:fillRef>
+          <a:effectRef idx="2">
+            <a:schemeClr val="accent1"/>
+          </a:effectRef>
+          <a:fontRef idx="minor">
+            <a:schemeClr val="lt1"/>
+          </a:fontRef>
+        </p:style>
+        <p:txBody>
+          <a:bodyPr rtlCol="0" anchor="ctr"/>
+          <a:lstStyle/>
+          <a:p>
+            <a:pPr algn="ctr"/>
+            <a:r>
+              <a:rPr lang="en-US" sz="1400" dirty="0" smtClean="0">
+                <a:solidFill>
+                  <a:srgbClr val="FFFFFF"/>
+                </a:solidFill>
+                <a:latin typeface="Rockwell"/>
+                <a:cs typeface="Rockwell"/>
+              </a:rPr>
+              <a:t>Multiple Linear Regression</a:t>
+            </a:r>
+            <a:endParaRPr lang="en-US" sz="1400" dirty="0">
+              <a:solidFill>
+                <a:srgbClr val="FFFFFF"/>
+              </a:solidFill>
+              <a:latin typeface="Rockwell"/>
+              <a:cs typeface="Rockwell"/>
+            </a:endParaRPr>
+          </a:p>
+        </p:txBody>
+      </p:sp>
+      <p:sp>
+        <p:nvSpPr>
+          <p:cNvPr id="9" name="Rectangle 8"/>
+          <p:cNvSpPr/>
+          <p:nvPr/>
+        </p:nvSpPr>
+        <p:spPr>
+          <a:xfrm>
+            <a:off x="4567817" y="6332355"/>
+            <a:ext cx="1428245" cy="539114"/>
+          </a:xfrm>
+          <a:prstGeom prst="rect">
+            <a:avLst/>
+          </a:prstGeom>
+          <a:solidFill>
+            <a:schemeClr val="accent3">
+              <a:lumMod val="50000"/>
+            </a:schemeClr>
+          </a:solidFill>
+          <a:ln>
+            <a:solidFill>
+              <a:schemeClr val="tx1"/>
+            </a:solidFill>
+          </a:ln>
+          <a:effectLst/>
+        </p:spPr>
+        <p:style>
+          <a:lnRef idx="1">
+            <a:schemeClr val="accent1"/>
+          </a:lnRef>
+          <a:fillRef idx="3">
+            <a:schemeClr val="accent1"/>
+          </a:fillRef>
+          <a:effectRef idx="2">
+            <a:schemeClr val="accent1"/>
+          </a:effectRef>
+          <a:fontRef idx="minor">
+            <a:schemeClr val="lt1"/>
+          </a:fontRef>
+        </p:style>
+        <p:txBody>
+          <a:bodyPr rtlCol="0" anchor="ctr"/>
+          <a:lstStyle/>
+          <a:p>
+            <a:pPr algn="ctr"/>
+            <a:r>
+              <a:rPr lang="en-US" sz="1400" dirty="0" smtClean="0">
+                <a:solidFill>
+                  <a:srgbClr val="FFFFFF"/>
+                </a:solidFill>
+                <a:latin typeface="Rockwell"/>
+                <a:cs typeface="Rockwell"/>
+              </a:rPr>
+              <a:t>ANOVA</a:t>
+            </a:r>
+            <a:endParaRPr lang="en-US" sz="1400" dirty="0">
+              <a:solidFill>
+                <a:srgbClr val="FFFFFF"/>
+              </a:solidFill>
+              <a:latin typeface="Rockwell"/>
+              <a:cs typeface="Rockwell"/>
+            </a:endParaRPr>
+          </a:p>
+        </p:txBody>
+      </p:sp>
+      <p:sp>
+        <p:nvSpPr>
+          <p:cNvPr id="10" name="TextBox 9"/>
+          <p:cNvSpPr txBox="1"/>
+          <p:nvPr/>
+        </p:nvSpPr>
+        <p:spPr>
+          <a:xfrm>
+            <a:off x="1" y="6435277"/>
+            <a:ext cx="1014934" cy="307777"/>
+          </a:xfrm>
+          <a:prstGeom prst="rect">
+            <a:avLst/>
+          </a:prstGeom>
+          <a:noFill/>
+        </p:spPr>
+        <p:txBody>
+          <a:bodyPr wrap="none" rtlCol="0" anchor="ctr">
+            <a:spAutoFit/>
+          </a:bodyPr>
+          <a:lstStyle/>
+          <a:p>
+            <a:r>
+              <a:rPr lang="en-US" sz="1400" dirty="0" smtClean="0">
+                <a:solidFill>
+                  <a:schemeClr val="bg1">
+                    <a:lumMod val="85000"/>
+                  </a:schemeClr>
+                </a:solidFill>
+                <a:latin typeface="Rockwell"/>
+                <a:cs typeface="Rockwell"/>
+              </a:rPr>
+              <a:t>MCB 293S</a:t>
+            </a:r>
+          </a:p>
+        </p:txBody>
+      </p:sp>
+      <p:sp>
+        <p:nvSpPr>
+          <p:cNvPr id="11" name="TextBox 10"/>
+          <p:cNvSpPr txBox="1"/>
+          <p:nvPr/>
+        </p:nvSpPr>
+        <p:spPr>
+          <a:xfrm>
+            <a:off x="8344983" y="6435277"/>
+            <a:ext cx="799017" cy="307777"/>
+          </a:xfrm>
+          <a:prstGeom prst="rect">
+            <a:avLst/>
+          </a:prstGeom>
+          <a:noFill/>
+        </p:spPr>
+        <p:txBody>
+          <a:bodyPr wrap="none" rtlCol="0" anchor="ctr">
+            <a:spAutoFit/>
+          </a:bodyPr>
+          <a:lstStyle/>
+          <a:p>
+            <a:pPr algn="r"/>
+            <a:r>
+              <a:rPr lang="en-US" sz="1400" dirty="0" smtClean="0">
+                <a:solidFill>
+                  <a:schemeClr val="bg1">
+                    <a:lumMod val="85000"/>
+                  </a:schemeClr>
+                </a:solidFill>
+                <a:latin typeface="Rockwell"/>
+                <a:cs typeface="Rockwell"/>
+              </a:rPr>
+              <a:t>Week </a:t>
+            </a:r>
+            <a:r>
+              <a:rPr lang="en-US" sz="1400" dirty="0" smtClean="0">
+                <a:solidFill>
+                  <a:schemeClr val="bg1">
+                    <a:lumMod val="85000"/>
+                  </a:schemeClr>
+                </a:solidFill>
+                <a:latin typeface="Rockwell"/>
+                <a:cs typeface="Rockwell"/>
+              </a:rPr>
+              <a:t>4</a:t>
+            </a:r>
+            <a:endParaRPr lang="en-US" sz="1400" dirty="0" smtClean="0">
+              <a:solidFill>
+                <a:schemeClr val="bg1">
+                  <a:lumMod val="85000"/>
+                </a:schemeClr>
+              </a:solidFill>
+              <a:latin typeface="Rockwell"/>
+              <a:cs typeface="Rockwell"/>
             </a:endParaRPr>
           </a:p>
         </p:txBody>
@@ -11517,6 +13764,233 @@
               </a:rPr>
               <a:t>Total Counts</a:t>
             </a:r>
+          </a:p>
+        </p:txBody>
+      </p:sp>
+      <p:sp>
+        <p:nvSpPr>
+          <p:cNvPr id="22" name="Rectangle 21"/>
+          <p:cNvSpPr/>
+          <p:nvPr/>
+        </p:nvSpPr>
+        <p:spPr>
+          <a:xfrm>
+            <a:off x="3139571" y="6332355"/>
+            <a:ext cx="1428245" cy="539114"/>
+          </a:xfrm>
+          <a:prstGeom prst="rect">
+            <a:avLst/>
+          </a:prstGeom>
+          <a:solidFill>
+            <a:schemeClr val="accent3">
+              <a:lumMod val="60000"/>
+              <a:lumOff val="40000"/>
+            </a:schemeClr>
+          </a:solidFill>
+          <a:ln>
+            <a:solidFill>
+              <a:srgbClr val="000000"/>
+            </a:solidFill>
+          </a:ln>
+          <a:effectLst/>
+        </p:spPr>
+        <p:style>
+          <a:lnRef idx="1">
+            <a:schemeClr val="accent1"/>
+          </a:lnRef>
+          <a:fillRef idx="3">
+            <a:schemeClr val="accent1"/>
+          </a:fillRef>
+          <a:effectRef idx="2">
+            <a:schemeClr val="accent1"/>
+          </a:effectRef>
+          <a:fontRef idx="minor">
+            <a:schemeClr val="lt1"/>
+          </a:fontRef>
+        </p:style>
+        <p:txBody>
+          <a:bodyPr rtlCol="0" anchor="ctr"/>
+          <a:lstStyle/>
+          <a:p>
+            <a:pPr algn="ctr"/>
+            <a:r>
+              <a:rPr lang="en-US" sz="1400" dirty="0" smtClean="0">
+                <a:solidFill>
+                  <a:srgbClr val="FFFFFF"/>
+                </a:solidFill>
+                <a:latin typeface="Rockwell"/>
+                <a:cs typeface="Rockwell"/>
+              </a:rPr>
+              <a:t>Multiple Linear Regression</a:t>
+            </a:r>
+            <a:endParaRPr lang="en-US" sz="1400" dirty="0">
+              <a:solidFill>
+                <a:srgbClr val="FFFFFF"/>
+              </a:solidFill>
+              <a:latin typeface="Rockwell"/>
+              <a:cs typeface="Rockwell"/>
+            </a:endParaRPr>
+          </a:p>
+        </p:txBody>
+      </p:sp>
+      <p:sp>
+        <p:nvSpPr>
+          <p:cNvPr id="26" name="Rectangle 25"/>
+          <p:cNvSpPr/>
+          <p:nvPr/>
+        </p:nvSpPr>
+        <p:spPr>
+          <a:xfrm>
+            <a:off x="4567817" y="6332355"/>
+            <a:ext cx="1428245" cy="539114"/>
+          </a:xfrm>
+          <a:prstGeom prst="rect">
+            <a:avLst/>
+          </a:prstGeom>
+          <a:solidFill>
+            <a:schemeClr val="accent3">
+              <a:lumMod val="50000"/>
+            </a:schemeClr>
+          </a:solidFill>
+          <a:ln>
+            <a:solidFill>
+              <a:schemeClr val="tx1"/>
+            </a:solidFill>
+          </a:ln>
+          <a:effectLst/>
+        </p:spPr>
+        <p:style>
+          <a:lnRef idx="1">
+            <a:schemeClr val="accent1"/>
+          </a:lnRef>
+          <a:fillRef idx="3">
+            <a:schemeClr val="accent1"/>
+          </a:fillRef>
+          <a:effectRef idx="2">
+            <a:schemeClr val="accent1"/>
+          </a:effectRef>
+          <a:fontRef idx="minor">
+            <a:schemeClr val="lt1"/>
+          </a:fontRef>
+        </p:style>
+        <p:txBody>
+          <a:bodyPr rtlCol="0" anchor="ctr"/>
+          <a:lstStyle/>
+          <a:p>
+            <a:pPr algn="ctr"/>
+            <a:r>
+              <a:rPr lang="en-US" sz="1400" dirty="0" smtClean="0">
+                <a:solidFill>
+                  <a:srgbClr val="FFFFFF"/>
+                </a:solidFill>
+                <a:latin typeface="Rockwell"/>
+                <a:cs typeface="Rockwell"/>
+              </a:rPr>
+              <a:t>ANOVA</a:t>
+            </a:r>
+            <a:endParaRPr lang="en-US" sz="1400" dirty="0">
+              <a:solidFill>
+                <a:srgbClr val="FFFFFF"/>
+              </a:solidFill>
+              <a:latin typeface="Rockwell"/>
+              <a:cs typeface="Rockwell"/>
+            </a:endParaRPr>
+          </a:p>
+        </p:txBody>
+      </p:sp>
+      <p:sp>
+        <p:nvSpPr>
+          <p:cNvPr id="27" name="TextBox 26"/>
+          <p:cNvSpPr txBox="1"/>
+          <p:nvPr/>
+        </p:nvSpPr>
+        <p:spPr>
+          <a:xfrm>
+            <a:off x="1" y="6435277"/>
+            <a:ext cx="1014934" cy="307777"/>
+          </a:xfrm>
+          <a:prstGeom prst="rect">
+            <a:avLst/>
+          </a:prstGeom>
+          <a:noFill/>
+        </p:spPr>
+        <p:txBody>
+          <a:bodyPr wrap="none" rtlCol="0" anchor="ctr">
+            <a:spAutoFit/>
+          </a:bodyPr>
+          <a:lstStyle/>
+          <a:p>
+            <a:r>
+              <a:rPr lang="en-US" sz="1400" dirty="0" smtClean="0">
+                <a:solidFill>
+                  <a:schemeClr val="bg1">
+                    <a:lumMod val="85000"/>
+                  </a:schemeClr>
+                </a:solidFill>
+                <a:latin typeface="Rockwell"/>
+                <a:cs typeface="Rockwell"/>
+              </a:rPr>
+              <a:t>MCB 293S</a:t>
+            </a:r>
+          </a:p>
+        </p:txBody>
+      </p:sp>
+      <p:sp>
+        <p:nvSpPr>
+          <p:cNvPr id="28" name="TextBox 27"/>
+          <p:cNvSpPr txBox="1"/>
+          <p:nvPr/>
+        </p:nvSpPr>
+        <p:spPr>
+          <a:xfrm>
+            <a:off x="8344983" y="6435277"/>
+            <a:ext cx="799017" cy="307777"/>
+          </a:xfrm>
+          <a:prstGeom prst="rect">
+            <a:avLst/>
+          </a:prstGeom>
+          <a:noFill/>
+        </p:spPr>
+        <p:txBody>
+          <a:bodyPr wrap="none" rtlCol="0" anchor="ctr">
+            <a:spAutoFit/>
+          </a:bodyPr>
+          <a:lstStyle/>
+          <a:p>
+            <a:pPr algn="r"/>
+            <a:r>
+              <a:rPr lang="en-US" sz="1400" dirty="0" smtClean="0">
+                <a:solidFill>
+                  <a:schemeClr val="bg1">
+                    <a:lumMod val="85000"/>
+                  </a:schemeClr>
+                </a:solidFill>
+                <a:latin typeface="Rockwell"/>
+                <a:cs typeface="Rockwell"/>
+              </a:rPr>
+              <a:t>Week </a:t>
+            </a:r>
+            <a:r>
+              <a:rPr lang="en-US" sz="1400" dirty="0" smtClean="0">
+                <a:solidFill>
+                  <a:schemeClr val="bg1">
+                    <a:lumMod val="85000"/>
+                  </a:schemeClr>
+                </a:solidFill>
+                <a:latin typeface="Rockwell"/>
+                <a:cs typeface="Rockwell"/>
+              </a:rPr>
+              <a:t>4</a:t>
+            </a:r>
+            <a:endParaRPr lang="en-US" sz="1400" dirty="0" smtClean="0">
+              <a:solidFill>
+                <a:schemeClr val="bg1">
+                  <a:lumMod val="85000"/>
+                </a:schemeClr>
+              </a:solidFill>
+              <a:latin typeface="Rockwell"/>
+              <a:cs typeface="Rockwell"/>
+            </a:endParaRPr>
           </a:p>
         </p:txBody>
       </p:sp>
@@ -13053,6 +15527,233 @@
           </a:p>
         </p:txBody>
       </p:sp>
+      <p:sp>
+        <p:nvSpPr>
+          <p:cNvPr id="22" name="Rectangle 21"/>
+          <p:cNvSpPr/>
+          <p:nvPr/>
+        </p:nvSpPr>
+        <p:spPr>
+          <a:xfrm>
+            <a:off x="3139571" y="6332355"/>
+            <a:ext cx="1428245" cy="539114"/>
+          </a:xfrm>
+          <a:prstGeom prst="rect">
+            <a:avLst/>
+          </a:prstGeom>
+          <a:solidFill>
+            <a:schemeClr val="accent3">
+              <a:lumMod val="60000"/>
+              <a:lumOff val="40000"/>
+            </a:schemeClr>
+          </a:solidFill>
+          <a:ln>
+            <a:solidFill>
+              <a:srgbClr val="000000"/>
+            </a:solidFill>
+          </a:ln>
+          <a:effectLst/>
+        </p:spPr>
+        <p:style>
+          <a:lnRef idx="1">
+            <a:schemeClr val="accent1"/>
+          </a:lnRef>
+          <a:fillRef idx="3">
+            <a:schemeClr val="accent1"/>
+          </a:fillRef>
+          <a:effectRef idx="2">
+            <a:schemeClr val="accent1"/>
+          </a:effectRef>
+          <a:fontRef idx="minor">
+            <a:schemeClr val="lt1"/>
+          </a:fontRef>
+        </p:style>
+        <p:txBody>
+          <a:bodyPr rtlCol="0" anchor="ctr"/>
+          <a:lstStyle/>
+          <a:p>
+            <a:pPr algn="ctr"/>
+            <a:r>
+              <a:rPr lang="en-US" sz="1400" dirty="0" smtClean="0">
+                <a:solidFill>
+                  <a:srgbClr val="FFFFFF"/>
+                </a:solidFill>
+                <a:latin typeface="Rockwell"/>
+                <a:cs typeface="Rockwell"/>
+              </a:rPr>
+              <a:t>Multiple Linear Regression</a:t>
+            </a:r>
+            <a:endParaRPr lang="en-US" sz="1400" dirty="0">
+              <a:solidFill>
+                <a:srgbClr val="FFFFFF"/>
+              </a:solidFill>
+              <a:latin typeface="Rockwell"/>
+              <a:cs typeface="Rockwell"/>
+            </a:endParaRPr>
+          </a:p>
+        </p:txBody>
+      </p:sp>
+      <p:sp>
+        <p:nvSpPr>
+          <p:cNvPr id="24" name="Rectangle 23"/>
+          <p:cNvSpPr/>
+          <p:nvPr/>
+        </p:nvSpPr>
+        <p:spPr>
+          <a:xfrm>
+            <a:off x="4567817" y="6332355"/>
+            <a:ext cx="1428245" cy="539114"/>
+          </a:xfrm>
+          <a:prstGeom prst="rect">
+            <a:avLst/>
+          </a:prstGeom>
+          <a:solidFill>
+            <a:schemeClr val="accent3">
+              <a:lumMod val="50000"/>
+            </a:schemeClr>
+          </a:solidFill>
+          <a:ln>
+            <a:solidFill>
+              <a:schemeClr val="tx1"/>
+            </a:solidFill>
+          </a:ln>
+          <a:effectLst/>
+        </p:spPr>
+        <p:style>
+          <a:lnRef idx="1">
+            <a:schemeClr val="accent1"/>
+          </a:lnRef>
+          <a:fillRef idx="3">
+            <a:schemeClr val="accent1"/>
+          </a:fillRef>
+          <a:effectRef idx="2">
+            <a:schemeClr val="accent1"/>
+          </a:effectRef>
+          <a:fontRef idx="minor">
+            <a:schemeClr val="lt1"/>
+          </a:fontRef>
+        </p:style>
+        <p:txBody>
+          <a:bodyPr rtlCol="0" anchor="ctr"/>
+          <a:lstStyle/>
+          <a:p>
+            <a:pPr algn="ctr"/>
+            <a:r>
+              <a:rPr lang="en-US" sz="1400" dirty="0" smtClean="0">
+                <a:solidFill>
+                  <a:srgbClr val="FFFFFF"/>
+                </a:solidFill>
+                <a:latin typeface="Rockwell"/>
+                <a:cs typeface="Rockwell"/>
+              </a:rPr>
+              <a:t>ANOVA</a:t>
+            </a:r>
+            <a:endParaRPr lang="en-US" sz="1400" dirty="0">
+              <a:solidFill>
+                <a:srgbClr val="FFFFFF"/>
+              </a:solidFill>
+              <a:latin typeface="Rockwell"/>
+              <a:cs typeface="Rockwell"/>
+            </a:endParaRPr>
+          </a:p>
+        </p:txBody>
+      </p:sp>
+      <p:sp>
+        <p:nvSpPr>
+          <p:cNvPr id="25" name="TextBox 24"/>
+          <p:cNvSpPr txBox="1"/>
+          <p:nvPr/>
+        </p:nvSpPr>
+        <p:spPr>
+          <a:xfrm>
+            <a:off x="1" y="6435277"/>
+            <a:ext cx="1014934" cy="307777"/>
+          </a:xfrm>
+          <a:prstGeom prst="rect">
+            <a:avLst/>
+          </a:prstGeom>
+          <a:noFill/>
+        </p:spPr>
+        <p:txBody>
+          <a:bodyPr wrap="none" rtlCol="0" anchor="ctr">
+            <a:spAutoFit/>
+          </a:bodyPr>
+          <a:lstStyle/>
+          <a:p>
+            <a:r>
+              <a:rPr lang="en-US" sz="1400" dirty="0" smtClean="0">
+                <a:solidFill>
+                  <a:schemeClr val="bg1">
+                    <a:lumMod val="85000"/>
+                  </a:schemeClr>
+                </a:solidFill>
+                <a:latin typeface="Rockwell"/>
+                <a:cs typeface="Rockwell"/>
+              </a:rPr>
+              <a:t>MCB 293S</a:t>
+            </a:r>
+          </a:p>
+        </p:txBody>
+      </p:sp>
+      <p:sp>
+        <p:nvSpPr>
+          <p:cNvPr id="27" name="TextBox 26"/>
+          <p:cNvSpPr txBox="1"/>
+          <p:nvPr/>
+        </p:nvSpPr>
+        <p:spPr>
+          <a:xfrm>
+            <a:off x="8344983" y="6435277"/>
+            <a:ext cx="799017" cy="307777"/>
+          </a:xfrm>
+          <a:prstGeom prst="rect">
+            <a:avLst/>
+          </a:prstGeom>
+          <a:noFill/>
+        </p:spPr>
+        <p:txBody>
+          <a:bodyPr wrap="none" rtlCol="0" anchor="ctr">
+            <a:spAutoFit/>
+          </a:bodyPr>
+          <a:lstStyle/>
+          <a:p>
+            <a:pPr algn="r"/>
+            <a:r>
+              <a:rPr lang="en-US" sz="1400" dirty="0" smtClean="0">
+                <a:solidFill>
+                  <a:schemeClr val="bg1">
+                    <a:lumMod val="85000"/>
+                  </a:schemeClr>
+                </a:solidFill>
+                <a:latin typeface="Rockwell"/>
+                <a:cs typeface="Rockwell"/>
+              </a:rPr>
+              <a:t>Week </a:t>
+            </a:r>
+            <a:r>
+              <a:rPr lang="en-US" sz="1400" dirty="0" smtClean="0">
+                <a:solidFill>
+                  <a:schemeClr val="bg1">
+                    <a:lumMod val="85000"/>
+                  </a:schemeClr>
+                </a:solidFill>
+                <a:latin typeface="Rockwell"/>
+                <a:cs typeface="Rockwell"/>
+              </a:rPr>
+              <a:t>4</a:t>
+            </a:r>
+            <a:endParaRPr lang="en-US" sz="1400" dirty="0" smtClean="0">
+              <a:solidFill>
+                <a:schemeClr val="bg1">
+                  <a:lumMod val="85000"/>
+                </a:schemeClr>
+              </a:solidFill>
+              <a:latin typeface="Rockwell"/>
+              <a:cs typeface="Rockwell"/>
+            </a:endParaRPr>
+          </a:p>
+        </p:txBody>
+      </p:sp>
     </p:spTree>
     <p:extLst>
       <p:ext uri="{BB962C8B-B14F-4D97-AF65-F5344CB8AC3E}">
@@ -13958,6 +16659,233 @@
             <a:endParaRPr lang="en-US" sz="1200" dirty="0">
               <a:latin typeface="Times"/>
               <a:cs typeface="Times"/>
+            </a:endParaRPr>
+          </a:p>
+        </p:txBody>
+      </p:sp>
+      <p:sp>
+        <p:nvSpPr>
+          <p:cNvPr id="12" name="Rectangle 11"/>
+          <p:cNvSpPr/>
+          <p:nvPr/>
+        </p:nvSpPr>
+        <p:spPr>
+          <a:xfrm>
+            <a:off x="3139571" y="6332355"/>
+            <a:ext cx="1428245" cy="539114"/>
+          </a:xfrm>
+          <a:prstGeom prst="rect">
+            <a:avLst/>
+          </a:prstGeom>
+          <a:solidFill>
+            <a:schemeClr val="accent3">
+              <a:lumMod val="60000"/>
+              <a:lumOff val="40000"/>
+            </a:schemeClr>
+          </a:solidFill>
+          <a:ln>
+            <a:solidFill>
+              <a:srgbClr val="000000"/>
+            </a:solidFill>
+          </a:ln>
+          <a:effectLst/>
+        </p:spPr>
+        <p:style>
+          <a:lnRef idx="1">
+            <a:schemeClr val="accent1"/>
+          </a:lnRef>
+          <a:fillRef idx="3">
+            <a:schemeClr val="accent1"/>
+          </a:fillRef>
+          <a:effectRef idx="2">
+            <a:schemeClr val="accent1"/>
+          </a:effectRef>
+          <a:fontRef idx="minor">
+            <a:schemeClr val="lt1"/>
+          </a:fontRef>
+        </p:style>
+        <p:txBody>
+          <a:bodyPr rtlCol="0" anchor="ctr"/>
+          <a:lstStyle/>
+          <a:p>
+            <a:pPr algn="ctr"/>
+            <a:r>
+              <a:rPr lang="en-US" sz="1400" dirty="0" smtClean="0">
+                <a:solidFill>
+                  <a:srgbClr val="FFFFFF"/>
+                </a:solidFill>
+                <a:latin typeface="Rockwell"/>
+                <a:cs typeface="Rockwell"/>
+              </a:rPr>
+              <a:t>Multiple Linear Regression</a:t>
+            </a:r>
+            <a:endParaRPr lang="en-US" sz="1400" dirty="0">
+              <a:solidFill>
+                <a:srgbClr val="FFFFFF"/>
+              </a:solidFill>
+              <a:latin typeface="Rockwell"/>
+              <a:cs typeface="Rockwell"/>
+            </a:endParaRPr>
+          </a:p>
+        </p:txBody>
+      </p:sp>
+      <p:sp>
+        <p:nvSpPr>
+          <p:cNvPr id="14" name="Rectangle 13"/>
+          <p:cNvSpPr/>
+          <p:nvPr/>
+        </p:nvSpPr>
+        <p:spPr>
+          <a:xfrm>
+            <a:off x="4567817" y="6332355"/>
+            <a:ext cx="1428245" cy="539114"/>
+          </a:xfrm>
+          <a:prstGeom prst="rect">
+            <a:avLst/>
+          </a:prstGeom>
+          <a:solidFill>
+            <a:schemeClr val="accent3">
+              <a:lumMod val="50000"/>
+            </a:schemeClr>
+          </a:solidFill>
+          <a:ln>
+            <a:solidFill>
+              <a:schemeClr val="tx1"/>
+            </a:solidFill>
+          </a:ln>
+          <a:effectLst/>
+        </p:spPr>
+        <p:style>
+          <a:lnRef idx="1">
+            <a:schemeClr val="accent1"/>
+          </a:lnRef>
+          <a:fillRef idx="3">
+            <a:schemeClr val="accent1"/>
+          </a:fillRef>
+          <a:effectRef idx="2">
+            <a:schemeClr val="accent1"/>
+          </a:effectRef>
+          <a:fontRef idx="minor">
+            <a:schemeClr val="lt1"/>
+          </a:fontRef>
+        </p:style>
+        <p:txBody>
+          <a:bodyPr rtlCol="0" anchor="ctr"/>
+          <a:lstStyle/>
+          <a:p>
+            <a:pPr algn="ctr"/>
+            <a:r>
+              <a:rPr lang="en-US" sz="1400" dirty="0" smtClean="0">
+                <a:solidFill>
+                  <a:srgbClr val="FFFFFF"/>
+                </a:solidFill>
+                <a:latin typeface="Rockwell"/>
+                <a:cs typeface="Rockwell"/>
+              </a:rPr>
+              <a:t>ANOVA</a:t>
+            </a:r>
+            <a:endParaRPr lang="en-US" sz="1400" dirty="0">
+              <a:solidFill>
+                <a:srgbClr val="FFFFFF"/>
+              </a:solidFill>
+              <a:latin typeface="Rockwell"/>
+              <a:cs typeface="Rockwell"/>
+            </a:endParaRPr>
+          </a:p>
+        </p:txBody>
+      </p:sp>
+      <p:sp>
+        <p:nvSpPr>
+          <p:cNvPr id="15" name="TextBox 14"/>
+          <p:cNvSpPr txBox="1"/>
+          <p:nvPr/>
+        </p:nvSpPr>
+        <p:spPr>
+          <a:xfrm>
+            <a:off x="1" y="6435277"/>
+            <a:ext cx="1014934" cy="307777"/>
+          </a:xfrm>
+          <a:prstGeom prst="rect">
+            <a:avLst/>
+          </a:prstGeom>
+          <a:noFill/>
+        </p:spPr>
+        <p:txBody>
+          <a:bodyPr wrap="none" rtlCol="0" anchor="ctr">
+            <a:spAutoFit/>
+          </a:bodyPr>
+          <a:lstStyle/>
+          <a:p>
+            <a:r>
+              <a:rPr lang="en-US" sz="1400" dirty="0" smtClean="0">
+                <a:solidFill>
+                  <a:schemeClr val="bg1">
+                    <a:lumMod val="85000"/>
+                  </a:schemeClr>
+                </a:solidFill>
+                <a:latin typeface="Rockwell"/>
+                <a:cs typeface="Rockwell"/>
+              </a:rPr>
+              <a:t>MCB 293S</a:t>
+            </a:r>
+          </a:p>
+        </p:txBody>
+      </p:sp>
+      <p:sp>
+        <p:nvSpPr>
+          <p:cNvPr id="16" name="TextBox 15"/>
+          <p:cNvSpPr txBox="1"/>
+          <p:nvPr/>
+        </p:nvSpPr>
+        <p:spPr>
+          <a:xfrm>
+            <a:off x="8344983" y="6435277"/>
+            <a:ext cx="799017" cy="307777"/>
+          </a:xfrm>
+          <a:prstGeom prst="rect">
+            <a:avLst/>
+          </a:prstGeom>
+          <a:noFill/>
+        </p:spPr>
+        <p:txBody>
+          <a:bodyPr wrap="none" rtlCol="0" anchor="ctr">
+            <a:spAutoFit/>
+          </a:bodyPr>
+          <a:lstStyle/>
+          <a:p>
+            <a:pPr algn="r"/>
+            <a:r>
+              <a:rPr lang="en-US" sz="1400" dirty="0" smtClean="0">
+                <a:solidFill>
+                  <a:schemeClr val="bg1">
+                    <a:lumMod val="85000"/>
+                  </a:schemeClr>
+                </a:solidFill>
+                <a:latin typeface="Rockwell"/>
+                <a:cs typeface="Rockwell"/>
+              </a:rPr>
+              <a:t>Week </a:t>
+            </a:r>
+            <a:r>
+              <a:rPr lang="en-US" sz="1400" dirty="0" smtClean="0">
+                <a:solidFill>
+                  <a:schemeClr val="bg1">
+                    <a:lumMod val="85000"/>
+                  </a:schemeClr>
+                </a:solidFill>
+                <a:latin typeface="Rockwell"/>
+                <a:cs typeface="Rockwell"/>
+              </a:rPr>
+              <a:t>4</a:t>
+            </a:r>
+            <a:endParaRPr lang="en-US" sz="1400" dirty="0" smtClean="0">
+              <a:solidFill>
+                <a:schemeClr val="bg1">
+                  <a:lumMod val="85000"/>
+                </a:schemeClr>
+              </a:solidFill>
+              <a:latin typeface="Rockwell"/>
+              <a:cs typeface="Rockwell"/>
             </a:endParaRPr>
           </a:p>
         </p:txBody>

</xml_diff>